<commit_message>
changes to report and conda yml
</commit_message>
<xml_diff>
--- a/report/Blastpoint Presentation.pptx
+++ b/report/Blastpoint Presentation.pptx
@@ -5,7 +5,7 @@
     <p:sldMasterId id="2147483714" r:id="rId1"/>
   </p:sldMasterIdLst>
   <p:notesMasterIdLst>
-    <p:notesMasterId r:id="rId18"/>
+    <p:notesMasterId r:id="rId21"/>
   </p:notesMasterIdLst>
   <p:sldIdLst>
     <p:sldId id="256" r:id="rId2"/>
@@ -23,7 +23,10 @@
     <p:sldId id="268" r:id="rId14"/>
     <p:sldId id="269" r:id="rId15"/>
     <p:sldId id="270" r:id="rId16"/>
-    <p:sldId id="271" r:id="rId17"/>
+    <p:sldId id="272" r:id="rId17"/>
+    <p:sldId id="273" r:id="rId18"/>
+    <p:sldId id="271" r:id="rId19"/>
+    <p:sldId id="274" r:id="rId20"/>
   </p:sldIdLst>
   <p:sldSz cx="12192000" cy="6858000"/>
   <p:notesSz cx="6858000" cy="9144000"/>
@@ -212,7 +215,7 @@
           <a:p>
             <a:fld id="{0559CFD8-04B9-254B-866B-C360AFE65CFD}" type="datetimeFigureOut">
               <a:rPr lang="en-US" smtClean="0"/>
-              <a:t>6/9/23</a:t>
+              <a:t>6/12/23</a:t>
             </a:fld>
             <a:endParaRPr lang="en-US"/>
           </a:p>
@@ -563,6 +566,90 @@
 </p:notes>
 </file>
 
+<file path=ppt/notesSlides/notesSlide2.xml><?xml version="1.0" encoding="utf-8"?>
+<p:notes xmlns:a="http://schemas.openxmlformats.org/drawingml/2006/main" xmlns:r="http://schemas.openxmlformats.org/officeDocument/2006/relationships" xmlns:p="http://schemas.openxmlformats.org/presentationml/2006/main">
+  <p:cSld>
+    <p:spTree>
+      <p:nvGrpSpPr>
+        <p:cNvPr id="1" name=""/>
+        <p:cNvGrpSpPr/>
+        <p:nvPr/>
+      </p:nvGrpSpPr>
+      <p:grpSpPr>
+        <a:xfrm>
+          <a:off x="0" y="0"/>
+          <a:ext cx="0" cy="0"/>
+          <a:chOff x="0" y="0"/>
+          <a:chExt cx="0" cy="0"/>
+        </a:xfrm>
+      </p:grpSpPr>
+      <p:sp>
+        <p:nvSpPr>
+          <p:cNvPr id="2" name="Slide Image Placeholder 1"/>
+          <p:cNvSpPr>
+            <a:spLocks noGrp="1" noRot="1" noChangeAspect="1"/>
+          </p:cNvSpPr>
+          <p:nvPr>
+            <p:ph type="sldImg"/>
+          </p:nvPr>
+        </p:nvSpPr>
+        <p:spPr/>
+      </p:sp>
+      <p:sp>
+        <p:nvSpPr>
+          <p:cNvPr id="3" name="Notes Placeholder 2"/>
+          <p:cNvSpPr>
+            <a:spLocks noGrp="1"/>
+          </p:cNvSpPr>
+          <p:nvPr>
+            <p:ph type="body" idx="1"/>
+          </p:nvPr>
+        </p:nvSpPr>
+        <p:spPr/>
+        <p:txBody>
+          <a:bodyPr/>
+          <a:lstStyle/>
+          <a:p>
+            <a:endParaRPr lang="en-US" dirty="0"/>
+          </a:p>
+        </p:txBody>
+      </p:sp>
+      <p:sp>
+        <p:nvSpPr>
+          <p:cNvPr id="4" name="Slide Number Placeholder 3"/>
+          <p:cNvSpPr>
+            <a:spLocks noGrp="1"/>
+          </p:cNvSpPr>
+          <p:nvPr>
+            <p:ph type="sldNum" sz="quarter" idx="5"/>
+          </p:nvPr>
+        </p:nvSpPr>
+        <p:spPr/>
+        <p:txBody>
+          <a:bodyPr/>
+          <a:lstStyle/>
+          <a:p>
+            <a:fld id="{C7759C47-AF2C-544B-A82A-78D49C1CA78D}" type="slidenum">
+              <a:rPr lang="en-US" smtClean="0"/>
+              <a:t>19</a:t>
+            </a:fld>
+            <a:endParaRPr lang="en-US"/>
+          </a:p>
+        </p:txBody>
+      </p:sp>
+    </p:spTree>
+    <p:extLst>
+      <p:ext uri="{BB962C8B-B14F-4D97-AF65-F5344CB8AC3E}">
+        <p14:creationId xmlns:p14="http://schemas.microsoft.com/office/powerpoint/2010/main" val="1682625076"/>
+      </p:ext>
+    </p:extLst>
+  </p:cSld>
+  <p:clrMapOvr>
+    <a:masterClrMapping/>
+  </p:clrMapOvr>
+</p:notes>
+</file>
+
 <file path=ppt/slideLayouts/slideLayout1.xml><?xml version="1.0" encoding="utf-8"?>
 <p:sldLayout xmlns:a="http://schemas.openxmlformats.org/drawingml/2006/main" xmlns:r="http://schemas.openxmlformats.org/officeDocument/2006/relationships" xmlns:p="http://schemas.openxmlformats.org/presentationml/2006/main" type="title" preserve="1">
   <p:cSld name="Title Slide">
@@ -726,7 +813,7 @@
           <a:p>
             <a:fld id="{4F957DC8-EB3F-C247-BDC1-9B76504F6943}" type="datetimeFigureOut">
               <a:rPr lang="en-US" smtClean="0"/>
-              <a:t>6/9/23</a:t>
+              <a:t>6/12/23</a:t>
             </a:fld>
             <a:endParaRPr lang="en-US"/>
           </a:p>
@@ -896,7 +983,7 @@
           <a:p>
             <a:fld id="{4F957DC8-EB3F-C247-BDC1-9B76504F6943}" type="datetimeFigureOut">
               <a:rPr lang="en-US" smtClean="0"/>
-              <a:t>6/9/23</a:t>
+              <a:t>6/12/23</a:t>
             </a:fld>
             <a:endParaRPr lang="en-US"/>
           </a:p>
@@ -1076,7 +1163,7 @@
           <a:p>
             <a:fld id="{4F957DC8-EB3F-C247-BDC1-9B76504F6943}" type="datetimeFigureOut">
               <a:rPr lang="en-US" smtClean="0"/>
-              <a:t>6/9/23</a:t>
+              <a:t>6/12/23</a:t>
             </a:fld>
             <a:endParaRPr lang="en-US"/>
           </a:p>
@@ -1246,7 +1333,7 @@
           <a:p>
             <a:fld id="{4F957DC8-EB3F-C247-BDC1-9B76504F6943}" type="datetimeFigureOut">
               <a:rPr lang="en-US" smtClean="0"/>
-              <a:t>6/9/23</a:t>
+              <a:t>6/12/23</a:t>
             </a:fld>
             <a:endParaRPr lang="en-US"/>
           </a:p>
@@ -1514,7 +1601,7 @@
           <a:p>
             <a:fld id="{4F957DC8-EB3F-C247-BDC1-9B76504F6943}" type="datetimeFigureOut">
               <a:rPr lang="en-US" smtClean="0"/>
-              <a:t>6/9/23</a:t>
+              <a:t>6/12/23</a:t>
             </a:fld>
             <a:endParaRPr lang="en-US"/>
           </a:p>
@@ -1746,7 +1833,7 @@
           <a:p>
             <a:fld id="{4F957DC8-EB3F-C247-BDC1-9B76504F6943}" type="datetimeFigureOut">
               <a:rPr lang="en-US" smtClean="0"/>
-              <a:t>6/9/23</a:t>
+              <a:t>6/12/23</a:t>
             </a:fld>
             <a:endParaRPr lang="en-US"/>
           </a:p>
@@ -2105,7 +2192,7 @@
           <a:p>
             <a:fld id="{4F957DC8-EB3F-C247-BDC1-9B76504F6943}" type="datetimeFigureOut">
               <a:rPr lang="en-US" smtClean="0"/>
-              <a:t>6/9/23</a:t>
+              <a:t>6/12/23</a:t>
             </a:fld>
             <a:endParaRPr lang="en-US"/>
           </a:p>
@@ -2246,7 +2333,7 @@
           <a:p>
             <a:fld id="{4F957DC8-EB3F-C247-BDC1-9B76504F6943}" type="datetimeFigureOut">
               <a:rPr lang="en-US" smtClean="0"/>
-              <a:t>6/9/23</a:t>
+              <a:t>6/12/23</a:t>
             </a:fld>
             <a:endParaRPr lang="en-US"/>
           </a:p>
@@ -2341,7 +2428,7 @@
           <a:p>
             <a:fld id="{4F957DC8-EB3F-C247-BDC1-9B76504F6943}" type="datetimeFigureOut">
               <a:rPr lang="en-US" smtClean="0"/>
-              <a:t>6/9/23</a:t>
+              <a:t>6/12/23</a:t>
             </a:fld>
             <a:endParaRPr lang="en-US"/>
           </a:p>
@@ -2698,7 +2785,7 @@
           <a:p>
             <a:fld id="{4F957DC8-EB3F-C247-BDC1-9B76504F6943}" type="datetimeFigureOut">
               <a:rPr lang="en-US" smtClean="0"/>
-              <a:t>6/9/23</a:t>
+              <a:t>6/12/23</a:t>
             </a:fld>
             <a:endParaRPr lang="en-US"/>
           </a:p>
@@ -3055,7 +3142,7 @@
           <a:p>
             <a:fld id="{4F957DC8-EB3F-C247-BDC1-9B76504F6943}" type="datetimeFigureOut">
               <a:rPr lang="en-US" smtClean="0"/>
-              <a:t>6/9/23</a:t>
+              <a:t>6/12/23</a:t>
             </a:fld>
             <a:endParaRPr lang="en-US"/>
           </a:p>
@@ -3297,7 +3384,7 @@
           <a:p>
             <a:fld id="{4F957DC8-EB3F-C247-BDC1-9B76504F6943}" type="datetimeFigureOut">
               <a:rPr lang="en-US" smtClean="0"/>
-              <a:t>6/9/23</a:t>
+              <a:t>6/12/23</a:t>
             </a:fld>
             <a:endParaRPr lang="en-US"/>
           </a:p>
@@ -3809,6 +3896,9 @@
               <a:t>Jared Andrews</a:t>
             </a:r>
           </a:p>
+          <a:p>
+            <a:endParaRPr lang="en-US" dirty="0"/>
+          </a:p>
         </p:txBody>
       </p:sp>
     </p:spTree>
@@ -3864,12 +3954,14 @@
           </a:xfrm>
         </p:spPr>
         <p:txBody>
-          <a:bodyPr/>
+          <a:bodyPr>
+            <a:normAutofit/>
+          </a:bodyPr>
           <a:lstStyle/>
           <a:p>
             <a:pPr algn="ctr"/>
             <a:r>
-              <a:rPr lang="en-US" b="1" dirty="0">
+              <a:rPr lang="en-US" sz="3200" b="1" dirty="0">
                 <a:latin typeface="Calibri" panose="020F0502020204030204" pitchFamily="34" charset="0"/>
                 <a:cs typeface="Calibri" panose="020F0502020204030204" pitchFamily="34" charset="0"/>
               </a:rPr>
@@ -3902,7 +3994,7 @@
         </p:spPr>
         <p:txBody>
           <a:bodyPr>
-            <a:normAutofit/>
+            <a:normAutofit lnSpcReduction="10000"/>
           </a:bodyPr>
           <a:lstStyle/>
           <a:p>
@@ -3934,7 +4026,14 @@
             </a:r>
             <a:r>
               <a:rPr lang="en-US" sz="1800" dirty="0"/>
-              <a:t>: 20% of data</a:t>
+              <a:t>: 20% of data	</a:t>
+            </a:r>
+          </a:p>
+          <a:p>
+            <a:pPr lvl="2"/>
+            <a:r>
+              <a:rPr lang="en-US" dirty="0"/>
+              <a:t>Training set used to create time-based 3-fold cross validation splits used during feature selection and hp-tuning</a:t>
             </a:r>
           </a:p>
           <a:p>
@@ -3952,7 +4051,7 @@
           </a:p>
           <a:p>
             <a:r>
-              <a:rPr lang="en-US" sz="2000" b="1" dirty="0"/>
+              <a:rPr lang="en-US" sz="2000" b="1" i="1" dirty="0"/>
               <a:t>Preprocessing</a:t>
             </a:r>
           </a:p>
@@ -4029,12 +4128,14 @@
           </a:xfrm>
         </p:spPr>
         <p:txBody>
-          <a:bodyPr/>
+          <a:bodyPr>
+            <a:normAutofit/>
+          </a:bodyPr>
           <a:lstStyle/>
           <a:p>
             <a:pPr algn="ctr"/>
             <a:r>
-              <a:rPr lang="en-US" b="1" dirty="0"/>
+              <a:rPr lang="en-US" sz="3200" b="1" dirty="0"/>
               <a:t>Training Process</a:t>
             </a:r>
           </a:p>
@@ -4058,17 +4159,20 @@
         </p:nvSpPr>
         <p:spPr>
           <a:xfrm>
-            <a:off x="2231136" y="1803633"/>
-            <a:ext cx="7729728" cy="4563611"/>
+            <a:off x="1648213" y="1740259"/>
+            <a:ext cx="8895573" cy="4689944"/>
           </a:xfrm>
         </p:spPr>
         <p:txBody>
-          <a:bodyPr>
-            <a:normAutofit fontScale="92500" lnSpcReduction="20000"/>
+          <a:bodyPr numCol="2" spcCol="182880">
+            <a:noAutofit/>
           </a:bodyPr>
           <a:lstStyle/>
           <a:p>
             <a:pPr marL="514350" indent="-514350">
+              <a:spcBef>
+                <a:spcPts val="400"/>
+              </a:spcBef>
               <a:buFont typeface="+mj-lt"/>
               <a:buAutoNum type="arabicPeriod"/>
             </a:pPr>
@@ -4078,14 +4182,22 @@
             </a:r>
           </a:p>
           <a:p>
-            <a:pPr lvl="1"/>
+            <a:pPr lvl="1">
+              <a:spcBef>
+                <a:spcPts val="400"/>
+              </a:spcBef>
+            </a:pPr>
             <a:r>
               <a:rPr lang="en-US" sz="1400" dirty="0"/>
-              <a:t>For ensemble models, feature selection wasn’t performed</a:t>
-            </a:r>
-          </a:p>
-          <a:p>
-            <a:pPr lvl="1"/>
+              <a:t>For ensemble models, feature selection wasn’t explicitly performed</a:t>
+            </a:r>
+          </a:p>
+          <a:p>
+            <a:pPr lvl="1">
+              <a:spcBef>
+                <a:spcPts val="400"/>
+              </a:spcBef>
+            </a:pPr>
             <a:r>
               <a:rPr lang="en-US" sz="1400" dirty="0"/>
               <a:t>For non-ensemble models, used the SFS (Sequential Forward Selection) feature selection wrapper method</a:t>
@@ -4093,6 +4205,9 @@
           </a:p>
           <a:p>
             <a:pPr marL="514350" indent="-514350">
+              <a:spcBef>
+                <a:spcPts val="400"/>
+              </a:spcBef>
               <a:buFont typeface="+mj-lt"/>
               <a:buAutoNum type="arabicPeriod"/>
             </a:pPr>
@@ -4102,7 +4217,11 @@
             </a:r>
           </a:p>
           <a:p>
-            <a:pPr lvl="1"/>
+            <a:pPr lvl="1">
+              <a:spcBef>
+                <a:spcPts val="400"/>
+              </a:spcBef>
+            </a:pPr>
             <a:r>
               <a:rPr lang="en-US" sz="1400" dirty="0"/>
               <a:t>Utilize </a:t>
@@ -4117,39 +4236,76 @@
             </a:r>
           </a:p>
           <a:p>
-            <a:pPr lvl="1"/>
+            <a:pPr lvl="2">
+              <a:spcBef>
+                <a:spcPts val="400"/>
+              </a:spcBef>
+            </a:pPr>
+            <a:r>
+              <a:rPr lang="en-US" sz="1200" dirty="0"/>
+              <a:t>Pruner: Hyperband</a:t>
+            </a:r>
+          </a:p>
+          <a:p>
+            <a:pPr lvl="2">
+              <a:spcBef>
+                <a:spcPts val="400"/>
+              </a:spcBef>
+            </a:pPr>
+            <a:r>
+              <a:rPr lang="en-US" sz="1200" dirty="0"/>
+              <a:t>Sampler: Tree-structure </a:t>
+            </a:r>
+            <a:r>
+              <a:rPr lang="en-US" sz="1200" dirty="0" err="1"/>
+              <a:t>Parzen</a:t>
+            </a:r>
+            <a:r>
+              <a:rPr lang="en-US" sz="1200" dirty="0"/>
+              <a:t> Estimator (TPE) </a:t>
+            </a:r>
+          </a:p>
+          <a:p>
+            <a:pPr lvl="1">
+              <a:spcBef>
+                <a:spcPts val="400"/>
+              </a:spcBef>
+            </a:pPr>
             <a:r>
               <a:rPr lang="en-US" sz="1400" dirty="0"/>
-              <a:t>Used training set to produce time-based 5-fold cross-validation sets</a:t>
-            </a:r>
-          </a:p>
-          <a:p>
-            <a:pPr lvl="2"/>
+              <a:t>Used training set to produce time-based 3-fold cross-validation sets</a:t>
+            </a:r>
+          </a:p>
+          <a:p>
+            <a:pPr lvl="2">
+              <a:spcBef>
+                <a:spcPts val="400"/>
+              </a:spcBef>
+            </a:pPr>
             <a:r>
               <a:rPr lang="en-US" sz="1400" dirty="0"/>
-              <a:t>HP configuration with the highest average </a:t>
-            </a:r>
-            <a:r>
-              <a:rPr lang="en-US" sz="1400" i="1" dirty="0"/>
-              <a:t>F1-score</a:t>
-            </a:r>
-            <a:r>
-              <a:rPr lang="en-US" sz="1400" dirty="0"/>
-              <a:t> across all folds was selected</a:t>
+              <a:t>HP configuration with the highest average scoring metric across all folds was selected</a:t>
             </a:r>
           </a:p>
           <a:p>
             <a:pPr marL="514350" indent="-514350">
+              <a:spcBef>
+                <a:spcPts val="400"/>
+              </a:spcBef>
               <a:buFont typeface="+mj-lt"/>
               <a:buAutoNum type="arabicPeriod"/>
             </a:pPr>
             <a:r>
               <a:rPr lang="en-US" sz="1600" b="1" i="1" dirty="0"/>
-              <a:t>Final Model Training</a:t>
-            </a:r>
-          </a:p>
-          <a:p>
-            <a:pPr lvl="1"/>
+              <a:t>Model Training</a:t>
+            </a:r>
+          </a:p>
+          <a:p>
+            <a:pPr lvl="1">
+              <a:spcBef>
+                <a:spcPts val="400"/>
+              </a:spcBef>
+            </a:pPr>
             <a:r>
               <a:rPr lang="en-US" sz="1400" dirty="0"/>
               <a:t>Train model using train set with the best feature set and best hyperparameters</a:t>
@@ -4157,36 +4313,50 @@
           </a:p>
           <a:p>
             <a:pPr marL="514350" indent="-514350">
+              <a:spcBef>
+                <a:spcPts val="400"/>
+              </a:spcBef>
               <a:buFont typeface="+mj-lt"/>
               <a:buAutoNum type="arabicPeriod"/>
             </a:pPr>
             <a:r>
               <a:rPr lang="en-US" sz="1600" b="1" i="1" dirty="0"/>
-              <a:t>Final Model Evaluation</a:t>
-            </a:r>
-          </a:p>
-          <a:p>
-            <a:pPr lvl="1"/>
+              <a:t>Model Evaluation</a:t>
+            </a:r>
+          </a:p>
+          <a:p>
+            <a:pPr lvl="1">
+              <a:spcBef>
+                <a:spcPts val="400"/>
+              </a:spcBef>
+            </a:pPr>
             <a:r>
               <a:rPr lang="en-US" sz="1400" dirty="0"/>
               <a:t>Perform model evaluation on test set</a:t>
             </a:r>
           </a:p>
           <a:p>
-            <a:pPr lvl="1"/>
+            <a:pPr lvl="1">
+              <a:spcBef>
+                <a:spcPts val="400"/>
+              </a:spcBef>
+            </a:pPr>
             <a:r>
               <a:rPr lang="en-US" sz="1400" dirty="0"/>
-              <a:t>Metrics: Accuracy, F1-Score, AUC Score, Recall</a:t>
+              <a:t>Metrics: Accuracy, F1-Score,  AUC Score, Recall</a:t>
             </a:r>
           </a:p>
           <a:p>
             <a:pPr marL="457200" indent="-457200">
+              <a:spcBef>
+                <a:spcPts val="400"/>
+              </a:spcBef>
               <a:buFont typeface="+mj-lt"/>
               <a:buAutoNum type="arabicPeriod"/>
             </a:pPr>
             <a:r>
               <a:rPr lang="en-US" sz="1600" b="1" i="1" dirty="0"/>
-              <a:t>Model </a:t>
+              <a:t> Model </a:t>
             </a:r>
             <a:r>
               <a:rPr lang="en-US" sz="1600" b="1" i="1" dirty="0" err="1"/>
@@ -4195,10 +4365,71 @@
             <a:endParaRPr lang="en-US" sz="1600" b="1" i="1" dirty="0"/>
           </a:p>
           <a:p>
-            <a:pPr lvl="1"/>
+            <a:pPr lvl="1">
+              <a:spcBef>
+                <a:spcPts val="400"/>
+              </a:spcBef>
+            </a:pPr>
             <a:r>
               <a:rPr lang="en-US" sz="1400" dirty="0"/>
               <a:t>Utilize native feature importance scores and SHAP values to gain insight into impact of features on the testing results</a:t>
+            </a:r>
+          </a:p>
+          <a:p>
+            <a:pPr marL="342900" indent="-342900">
+              <a:spcBef>
+                <a:spcPts val="400"/>
+              </a:spcBef>
+              <a:buFont typeface="+mj-lt"/>
+              <a:buAutoNum type="arabicPeriod"/>
+            </a:pPr>
+            <a:r>
+              <a:rPr lang="en-US" sz="1600" b="1" i="1" dirty="0"/>
+              <a:t>   Final Model Training</a:t>
+            </a:r>
+          </a:p>
+          <a:p>
+            <a:pPr lvl="1">
+              <a:spcBef>
+                <a:spcPts val="400"/>
+              </a:spcBef>
+            </a:pPr>
+            <a:r>
+              <a:rPr lang="en-US" sz="1400" dirty="0"/>
+              <a:t>Train model using all the data with the best feature set and best hyperparameters (used in “production”)</a:t>
+            </a:r>
+            <a:endParaRPr lang="en-US" sz="1400" b="1" i="1" dirty="0"/>
+          </a:p>
+          <a:p>
+            <a:pPr marL="342900" indent="-342900">
+              <a:spcBef>
+                <a:spcPts val="400"/>
+              </a:spcBef>
+              <a:buFont typeface="+mj-lt"/>
+              <a:buAutoNum type="arabicPeriod"/>
+            </a:pPr>
+            <a:r>
+              <a:rPr lang="en-US" sz="1600" b="1" i="1" dirty="0"/>
+              <a:t>   Experiment Tracking</a:t>
+            </a:r>
+          </a:p>
+          <a:p>
+            <a:pPr lvl="1">
+              <a:spcBef>
+                <a:spcPts val="400"/>
+              </a:spcBef>
+            </a:pPr>
+            <a:r>
+              <a:rPr lang="en-US" sz="1400" dirty="0"/>
+              <a:t>Log and track model training artifacts/results via the Weights and Biases </a:t>
+            </a:r>
+            <a:r>
+              <a:rPr lang="en-US" sz="1400" dirty="0" err="1"/>
+              <a:t>MLOps</a:t>
+            </a:r>
+            <a:r>
+              <a:rPr lang="en-US" sz="1400" dirty="0"/>
+              <a:t> platform</a:t>
             </a:r>
           </a:p>
         </p:txBody>
@@ -4256,12 +4487,14 @@
           </a:xfrm>
         </p:spPr>
         <p:txBody>
-          <a:bodyPr/>
+          <a:bodyPr>
+            <a:normAutofit/>
+          </a:bodyPr>
           <a:lstStyle/>
           <a:p>
             <a:pPr algn="ctr"/>
             <a:r>
-              <a:rPr lang="en-US" b="1" dirty="0">
+              <a:rPr lang="en-US" sz="3200" b="1" dirty="0">
                 <a:latin typeface="Calibri" panose="020F0502020204030204" pitchFamily="34" charset="0"/>
                 <a:cs typeface="Calibri" panose="020F0502020204030204" pitchFamily="34" charset="0"/>
               </a:rPr>
@@ -4298,7 +4531,7 @@
           <a:p>
             <a:r>
               <a:rPr lang="en-US" b="1" i="1" dirty="0"/>
-              <a:t>Train/Tested models listed below</a:t>
+              <a:t>Train/Tested models</a:t>
             </a:r>
             <a:r>
               <a:rPr lang="en-US" dirty="0"/>
@@ -4339,83 +4572,16 @@
           </a:p>
           <a:p>
             <a:pPr lvl="1"/>
+            <a:r>
+              <a:rPr lang="en-US" dirty="0">
+                <a:hlinkClick r:id="rId2"/>
+              </a:rPr>
+              <a:t>WeightsAndBiases Overview</a:t>
+            </a:r>
             <a:endParaRPr lang="en-US" dirty="0"/>
           </a:p>
         </p:txBody>
       </p:sp>
-      <p:pic>
-        <p:nvPicPr>
-          <p:cNvPr id="7" name="Picture 6" descr="Table&#10;&#10;Description automatically generated">
-            <a:extLst>
-              <a:ext uri="{FF2B5EF4-FFF2-40B4-BE49-F238E27FC236}">
-                <a16:creationId xmlns:a16="http://schemas.microsoft.com/office/drawing/2014/main" id="{B23B0049-BE1C-742B-A122-BAC29989A7E6}"/>
-              </a:ext>
-            </a:extLst>
-          </p:cNvPr>
-          <p:cNvPicPr>
-            <a:picLocks noChangeAspect="1"/>
-          </p:cNvPicPr>
-          <p:nvPr/>
-        </p:nvPicPr>
-        <p:blipFill>
-          <a:blip r:embed="rId2"/>
-          <a:stretch>
-            <a:fillRect/>
-          </a:stretch>
-        </p:blipFill>
-        <p:spPr>
-          <a:xfrm>
-            <a:off x="463847" y="3922543"/>
-            <a:ext cx="5632153" cy="1463040"/>
-          </a:xfrm>
-          <a:prstGeom prst="rect">
-            <a:avLst/>
-          </a:prstGeom>
-          <a:ln>
-            <a:solidFill>
-              <a:schemeClr val="tx1"/>
-            </a:solidFill>
-          </a:ln>
-        </p:spPr>
-      </p:pic>
-      <p:pic>
-        <p:nvPicPr>
-          <p:cNvPr id="11" name="Picture 10" descr="Chart&#10;&#10;Description automatically generated">
-            <a:extLst>
-              <a:ext uri="{FF2B5EF4-FFF2-40B4-BE49-F238E27FC236}">
-                <a16:creationId xmlns:a16="http://schemas.microsoft.com/office/drawing/2014/main" id="{AA236D1D-1109-46B6-DAA0-D7EF287B45AA}"/>
-              </a:ext>
-            </a:extLst>
-          </p:cNvPr>
-          <p:cNvPicPr>
-            <a:picLocks noChangeAspect="1"/>
-          </p:cNvPicPr>
-          <p:nvPr/>
-        </p:nvPicPr>
-        <p:blipFill>
-          <a:blip r:embed="rId3"/>
-          <a:stretch>
-            <a:fillRect/>
-          </a:stretch>
-        </p:blipFill>
-        <p:spPr>
-          <a:xfrm>
-            <a:off x="6241753" y="2772603"/>
-            <a:ext cx="5486400" cy="3657600"/>
-          </a:xfrm>
-          <a:prstGeom prst="rect">
-            <a:avLst/>
-          </a:prstGeom>
-          <a:solidFill>
-            <a:schemeClr val="bg1"/>
-          </a:solidFill>
-          <a:ln>
-            <a:solidFill>
-              <a:schemeClr val="tx1"/>
-            </a:solidFill>
-          </a:ln>
-        </p:spPr>
-      </p:pic>
     </p:spTree>
     <p:extLst>
       <p:ext uri="{BB962C8B-B14F-4D97-AF65-F5344CB8AC3E}">
@@ -4469,12 +4635,14 @@
           </a:xfrm>
         </p:spPr>
         <p:txBody>
-          <a:bodyPr/>
+          <a:bodyPr>
+            <a:normAutofit/>
+          </a:bodyPr>
           <a:lstStyle/>
           <a:p>
             <a:pPr algn="ctr"/>
             <a:r>
-              <a:rPr lang="en-US" b="1" dirty="0">
+              <a:rPr lang="en-US" sz="3200" b="1" dirty="0">
                 <a:latin typeface="Calibri" panose="020F0502020204030204" pitchFamily="34" charset="0"/>
                 <a:cs typeface="Calibri" panose="020F0502020204030204" pitchFamily="34" charset="0"/>
               </a:rPr>
@@ -4502,7 +4670,7 @@
         <p:spPr>
           <a:xfrm>
             <a:off x="838200" y="1844239"/>
-            <a:ext cx="10515600" cy="4351338"/>
+            <a:ext cx="4793055" cy="4351338"/>
           </a:xfrm>
         </p:spPr>
         <p:txBody>
@@ -4511,15 +4679,45 @@
           <a:p>
             <a:r>
               <a:rPr lang="en-US" dirty="0"/>
-              <a:t>Given highest accuracy, F1-score, recall and AUC-score, the </a:t>
-            </a:r>
-            <a:r>
-              <a:rPr lang="en-US" b="1" i="1" dirty="0" err="1"/>
-              <a:t>XGBoost</a:t>
+              <a:t>Based on test results, the </a:t>
+            </a:r>
+            <a:r>
+              <a:rPr lang="en-US" b="1" i="1" dirty="0"/>
+              <a:t>Random Forest Classifier</a:t>
             </a:r>
             <a:r>
               <a:rPr lang="en-US" dirty="0"/>
-              <a:t> model would be chosen for production</a:t>
+              <a:t> would be chosen as the production model</a:t>
+            </a:r>
+          </a:p>
+          <a:p>
+            <a:pPr lvl="1"/>
+            <a:r>
+              <a:rPr lang="en-US" sz="1400" dirty="0"/>
+              <a:t>Best AUC, F1 and recall scores, training efficiency</a:t>
+            </a:r>
+          </a:p>
+          <a:p>
+            <a:pPr lvl="1"/>
+            <a:r>
+              <a:rPr lang="en-US" sz="1400" dirty="0"/>
+              <a:t>Caveat: further training improvements/more training data would likely improve </a:t>
+            </a:r>
+            <a:r>
+              <a:rPr lang="en-US" sz="1400" dirty="0" err="1"/>
+              <a:t>XGBoost’s</a:t>
+            </a:r>
+            <a:r>
+              <a:rPr lang="en-US" sz="1400" dirty="0"/>
+              <a:t> results when compared to </a:t>
+            </a:r>
+            <a:r>
+              <a:rPr lang="en-US" sz="1400" dirty="0" err="1"/>
+              <a:t>RandomForest’s</a:t>
+            </a:r>
+            <a:r>
+              <a:rPr lang="en-US" sz="1400" dirty="0"/>
+              <a:t> results</a:t>
             </a:r>
           </a:p>
           <a:p>
@@ -4542,104 +4740,59 @@
           </a:p>
           <a:p>
             <a:pPr lvl="1"/>
-            <a:r>
-              <a:rPr lang="en-US" sz="1800" dirty="0"/>
-              <a:t>{booster: dart, lambda: 1.3195240310678462e-08, alpha: 2.2781983645806513e-06, </a:t>
-            </a:r>
-            <a:r>
-              <a:rPr lang="en-US" sz="1800" dirty="0" err="1"/>
-              <a:t>n_estimators</a:t>
-            </a:r>
-            <a:r>
-              <a:rPr lang="en-US" sz="1800" dirty="0"/>
-              <a:t>: 400, </a:t>
-            </a:r>
-            <a:r>
-              <a:rPr lang="en-US" sz="1800" b="1" dirty="0" err="1"/>
-              <a:t>max_depth</a:t>
-            </a:r>
-            <a:r>
-              <a:rPr lang="en-US" sz="1800" b="1" dirty="0"/>
-              <a:t>: 1</a:t>
-            </a:r>
-            <a:r>
-              <a:rPr lang="en-US" sz="1800" dirty="0"/>
-              <a:t>, eta: 0.13090701285954356, gamma: 0.8560804526399561, </a:t>
-            </a:r>
-            <a:r>
-              <a:rPr lang="en-US" sz="1800" dirty="0" err="1"/>
-              <a:t>grow_policy</a:t>
-            </a:r>
-            <a:r>
-              <a:rPr lang="en-US" sz="1800" dirty="0"/>
-              <a:t>: </a:t>
-            </a:r>
-            <a:r>
-              <a:rPr lang="en-US" sz="1800" dirty="0" err="1"/>
-              <a:t>depthwise</a:t>
-            </a:r>
-            <a:r>
-              <a:rPr lang="en-US" sz="1800" dirty="0"/>
-              <a:t>, </a:t>
-            </a:r>
-            <a:r>
-              <a:rPr lang="en-US" sz="1800" dirty="0" err="1"/>
-              <a:t>sample_type</a:t>
-            </a:r>
-            <a:r>
-              <a:rPr lang="en-US" sz="1800" dirty="0"/>
-              <a:t>: uniform, </a:t>
-            </a:r>
-            <a:r>
-              <a:rPr lang="en-US" sz="1800" dirty="0" err="1"/>
-              <a:t>normalize_type</a:t>
-            </a:r>
-            <a:r>
-              <a:rPr lang="en-US" sz="1800" dirty="0"/>
-              <a:t>: forest, </a:t>
-            </a:r>
-            <a:r>
-              <a:rPr lang="en-US" sz="1800" dirty="0" err="1"/>
-              <a:t>rate_drop</a:t>
-            </a:r>
-            <a:r>
-              <a:rPr lang="en-US" sz="1800" dirty="0"/>
-              <a:t>: 8.428644473771179e-05, </a:t>
-            </a:r>
-            <a:r>
-              <a:rPr lang="en-US" sz="1800" dirty="0" err="1"/>
-              <a:t>skip_drop</a:t>
-            </a:r>
-            <a:r>
-              <a:rPr lang="en-US" sz="1800" dirty="0"/>
-              <a:t>: 1.1292626245131823e-05}</a:t>
-            </a:r>
-          </a:p>
-          <a:p>
+            <a:endParaRPr lang="en-US" dirty="0"/>
+          </a:p>
+          <a:p>
+            <a:endParaRPr lang="en-US" dirty="0"/>
+          </a:p>
+        </p:txBody>
+      </p:sp>
+      <p:sp>
+        <p:nvSpPr>
+          <p:cNvPr id="8" name="TextBox 7">
+            <a:extLst>
+              <a:ext uri="{FF2B5EF4-FFF2-40B4-BE49-F238E27FC236}">
+                <a16:creationId xmlns:a16="http://schemas.microsoft.com/office/drawing/2014/main" id="{E8DCD323-A346-D192-6B0F-0825F9108192}"/>
+              </a:ext>
+            </a:extLst>
+          </p:cNvPr>
+          <p:cNvSpPr txBox="1"/>
+          <p:nvPr/>
+        </p:nvSpPr>
+        <p:spPr>
+          <a:xfrm>
+            <a:off x="7230753" y="1960103"/>
+            <a:ext cx="3298477" cy="369332"/>
+          </a:xfrm>
+          <a:prstGeom prst="rect">
+            <a:avLst/>
+          </a:prstGeom>
+          <a:noFill/>
+        </p:spPr>
+        <p:txBody>
+          <a:bodyPr wrap="square">
+            <a:spAutoFit/>
+          </a:bodyPr>
+          <a:lstStyle/>
+          <a:p>
+            <a:pPr algn="ctr"/>
             <a:r>
               <a:rPr lang="en-US" b="1" i="1" dirty="0"/>
-              <a:t>Train/Testing Results</a:t>
+              <a:t>Random Forest Testing Results</a:t>
             </a:r>
             <a:r>
               <a:rPr lang="en-US" dirty="0"/>
               <a:t>:</a:t>
             </a:r>
           </a:p>
-          <a:p>
-            <a:pPr lvl="1"/>
-            <a:endParaRPr lang="en-US" dirty="0"/>
-          </a:p>
-          <a:p>
-            <a:endParaRPr lang="en-US" dirty="0"/>
-          </a:p>
         </p:txBody>
       </p:sp>
       <p:pic>
         <p:nvPicPr>
-          <p:cNvPr id="7" name="Picture 6" descr="Table&#10;&#10;Description automatically generated">
+          <p:cNvPr id="13" name="Picture 12" descr="A picture containing text, diagram, line, plot&#10;&#10;Description automatically generated">
             <a:extLst>
               <a:ext uri="{FF2B5EF4-FFF2-40B4-BE49-F238E27FC236}">
-                <a16:creationId xmlns:a16="http://schemas.microsoft.com/office/drawing/2014/main" id="{1FB367D3-F10E-304B-D758-417BCF4E3803}"/>
+                <a16:creationId xmlns:a16="http://schemas.microsoft.com/office/drawing/2014/main" id="{F1FE6AAC-1D70-CF6D-0E28-2E09350557A1}"/>
               </a:ext>
             </a:extLst>
           </p:cNvPr>
@@ -4656,8 +4809,8 @@
         </p:blipFill>
         <p:spPr>
           <a:xfrm>
-            <a:off x="1189448" y="4798460"/>
-            <a:ext cx="3771900" cy="1905000"/>
+            <a:off x="7112151" y="2329435"/>
+            <a:ext cx="3535680" cy="2651760"/>
           </a:xfrm>
           <a:prstGeom prst="rect">
             <a:avLst/>
@@ -4671,10 +4824,44 @@
       </p:pic>
       <p:pic>
         <p:nvPicPr>
-          <p:cNvPr id="9" name="Picture 8" descr="Chart&#10;&#10;Description automatically generated">
+          <p:cNvPr id="15" name="Picture 14" descr="A screenshot of a computer&#10;&#10;Description automatically generated with medium confidence">
             <a:extLst>
               <a:ext uri="{FF2B5EF4-FFF2-40B4-BE49-F238E27FC236}">
-                <a16:creationId xmlns:a16="http://schemas.microsoft.com/office/drawing/2014/main" id="{7F36242A-3AEA-D918-BE30-6DBCDB308191}"/>
+                <a16:creationId xmlns:a16="http://schemas.microsoft.com/office/drawing/2014/main" id="{2734FF26-2543-6804-F1FE-758E44F7748E}"/>
+              </a:ext>
+            </a:extLst>
+          </p:cNvPr>
+          <p:cNvPicPr>
+            <a:picLocks noChangeAspect="1"/>
+          </p:cNvPicPr>
+          <p:nvPr/>
+        </p:nvPicPr>
+        <p:blipFill rotWithShape="1">
+          <a:blip r:embed="rId4"/>
+          <a:srcRect b="13726"/>
+          <a:stretch/>
+        </p:blipFill>
+        <p:spPr>
+          <a:xfrm>
+            <a:off x="790350" y="4418206"/>
+            <a:ext cx="4157740" cy="1656669"/>
+          </a:xfrm>
+          <a:prstGeom prst="rect">
+            <a:avLst/>
+          </a:prstGeom>
+          <a:ln>
+            <a:solidFill>
+              <a:schemeClr val="tx1"/>
+            </a:solidFill>
+          </a:ln>
+        </p:spPr>
+      </p:pic>
+      <p:pic>
+        <p:nvPicPr>
+          <p:cNvPr id="17" name="Picture 16" descr="A picture containing text, screenshot, font, number&#10;&#10;Description automatically generated">
+            <a:extLst>
+              <a:ext uri="{FF2B5EF4-FFF2-40B4-BE49-F238E27FC236}">
+                <a16:creationId xmlns:a16="http://schemas.microsoft.com/office/drawing/2014/main" id="{A15BD50F-D983-2DAF-C73D-771DD72561C5}"/>
               </a:ext>
             </a:extLst>
           </p:cNvPr>
@@ -4684,22 +4871,19 @@
           <p:nvPr/>
         </p:nvPicPr>
         <p:blipFill>
-          <a:blip r:embed="rId4"/>
+          <a:blip r:embed="rId5"/>
           <a:stretch>
             <a:fillRect/>
           </a:stretch>
         </p:blipFill>
         <p:spPr>
           <a:xfrm>
-            <a:off x="6533294" y="4308149"/>
-            <a:ext cx="3749040" cy="2499360"/>
+            <a:off x="6234763" y="5088647"/>
+            <a:ext cx="5290455" cy="1645920"/>
           </a:xfrm>
           <a:prstGeom prst="rect">
             <a:avLst/>
           </a:prstGeom>
-          <a:solidFill>
-            <a:schemeClr val="bg1"/>
-          </a:solidFill>
           <a:ln>
             <a:solidFill>
               <a:schemeClr val="tx1"/>
@@ -4760,26 +4944,28 @@
           </a:xfrm>
         </p:spPr>
         <p:txBody>
-          <a:bodyPr/>
+          <a:bodyPr>
+            <a:normAutofit fontScale="90000"/>
+          </a:bodyPr>
           <a:lstStyle/>
           <a:p>
             <a:pPr algn="ctr"/>
             <a:r>
-              <a:rPr lang="en-US" b="1" dirty="0">
+              <a:rPr lang="en-US" sz="3200" b="1" dirty="0">
                 <a:latin typeface="Calibri" panose="020F0502020204030204" pitchFamily="34" charset="0"/>
                 <a:cs typeface="Calibri" panose="020F0502020204030204" pitchFamily="34" charset="0"/>
               </a:rPr>
               <a:t>Model </a:t>
             </a:r>
             <a:r>
-              <a:rPr lang="en-US" b="1" dirty="0" err="1">
+              <a:rPr lang="en-US" sz="3200" b="1" dirty="0" err="1">
                 <a:latin typeface="Calibri" panose="020F0502020204030204" pitchFamily="34" charset="0"/>
                 <a:cs typeface="Calibri" panose="020F0502020204030204" pitchFamily="34" charset="0"/>
               </a:rPr>
               <a:t>Explainability</a:t>
             </a:r>
             <a:r>
-              <a:rPr lang="en-US" b="1" dirty="0">
+              <a:rPr lang="en-US" sz="3200" b="1" dirty="0">
                 <a:latin typeface="Calibri" panose="020F0502020204030204" pitchFamily="34" charset="0"/>
                 <a:cs typeface="Calibri" panose="020F0502020204030204" pitchFamily="34" charset="0"/>
               </a:rPr>
@@ -4816,81 +5002,146 @@
           </a:bodyPr>
           <a:lstStyle/>
           <a:p>
-            <a:pPr lvl="1"/>
-            <a:r>
-              <a:rPr lang="en-US" sz="2100" dirty="0"/>
+            <a:pPr lvl="1">
+              <a:spcBef>
+                <a:spcPts val="400"/>
+              </a:spcBef>
+            </a:pPr>
+            <a:r>
+              <a:rPr lang="en-US" sz="2000" dirty="0"/>
               <a:t>Calculated via </a:t>
             </a:r>
             <a:r>
-              <a:rPr lang="en-US" sz="2100" dirty="0" err="1"/>
-              <a:t>XGBoost’s</a:t>
-            </a:r>
-            <a:r>
-              <a:rPr lang="en-US" sz="2100" dirty="0"/>
+              <a:rPr lang="en-US" sz="2000" dirty="0" err="1"/>
+              <a:t>RandomForest’s</a:t>
+            </a:r>
+            <a:r>
+              <a:rPr lang="en-US" sz="2000" dirty="0"/>
               <a:t> native feature importance score method</a:t>
             </a:r>
           </a:p>
           <a:p>
-            <a:pPr lvl="1"/>
-            <a:r>
-              <a:rPr lang="en-US" sz="2100" dirty="0"/>
-              <a:t>Utilizes “gain” which is “the improvement in accuracy brought by a feature to the branches it is on during training”</a:t>
-            </a:r>
-          </a:p>
-          <a:p>
-            <a:pPr lvl="1"/>
-            <a:endParaRPr lang="en-US" sz="2100" dirty="0"/>
-          </a:p>
-          <a:p>
-            <a:pPr lvl="1"/>
-            <a:endParaRPr lang="en-US" sz="2100" dirty="0"/>
-          </a:p>
-          <a:p>
-            <a:pPr lvl="1"/>
-            <a:endParaRPr lang="en-US" sz="2100" dirty="0"/>
+            <a:pPr lvl="1">
+              <a:spcBef>
+                <a:spcPts val="400"/>
+              </a:spcBef>
+            </a:pPr>
+            <a:r>
+              <a:rPr lang="en-US" sz="2000" dirty="0"/>
+              <a:t>Utilizes “mean decrease in impurity” which quantifies how well a feature was able to split good and bad loans across all splits the feature was used in</a:t>
+            </a:r>
+          </a:p>
+          <a:p>
+            <a:pPr lvl="1">
+              <a:spcBef>
+                <a:spcPts val="400"/>
+              </a:spcBef>
+            </a:pPr>
+            <a:endParaRPr lang="en-US" sz="2000" dirty="0"/>
+          </a:p>
+          <a:p>
+            <a:pPr lvl="1">
+              <a:spcBef>
+                <a:spcPts val="400"/>
+              </a:spcBef>
+            </a:pPr>
+            <a:endParaRPr lang="en-US" sz="2000" dirty="0"/>
+          </a:p>
+          <a:p>
+            <a:pPr lvl="1">
+              <a:spcBef>
+                <a:spcPts val="400"/>
+              </a:spcBef>
+            </a:pPr>
+            <a:endParaRPr lang="en-US" sz="2000" dirty="0"/>
+          </a:p>
+          <a:p>
+            <a:pPr lvl="1">
+              <a:spcBef>
+                <a:spcPts val="400"/>
+              </a:spcBef>
+            </a:pPr>
+            <a:endParaRPr lang="en-US" sz="2000" dirty="0"/>
+          </a:p>
+          <a:p>
+            <a:pPr lvl="1">
+              <a:spcBef>
+                <a:spcPts val="400"/>
+              </a:spcBef>
+            </a:pPr>
+            <a:endParaRPr lang="en-US" sz="2000" dirty="0"/>
           </a:p>
           <a:p>
             <a:pPr marL="457200" lvl="1" indent="0">
+              <a:spcBef>
+                <a:spcPts val="400"/>
+              </a:spcBef>
               <a:buNone/>
             </a:pPr>
-            <a:endParaRPr lang="en-US" sz="2100" dirty="0"/>
-          </a:p>
-          <a:p>
-            <a:pPr lvl="1"/>
-            <a:r>
-              <a:rPr lang="en-US" sz="2100" b="1" i="1" dirty="0"/>
+            <a:endParaRPr lang="en-US" sz="2000" dirty="0"/>
+          </a:p>
+          <a:p>
+            <a:pPr marL="457200" lvl="1" indent="0">
+              <a:spcBef>
+                <a:spcPts val="400"/>
+              </a:spcBef>
+              <a:buNone/>
+            </a:pPr>
+            <a:endParaRPr lang="en-US" sz="2000" dirty="0"/>
+          </a:p>
+          <a:p>
+            <a:pPr lvl="1">
+              <a:spcBef>
+                <a:spcPts val="400"/>
+              </a:spcBef>
+            </a:pPr>
+            <a:endParaRPr lang="en-US" sz="2000" b="1" i="1" dirty="0"/>
+          </a:p>
+          <a:p>
+            <a:pPr lvl="1">
+              <a:spcBef>
+                <a:spcPts val="400"/>
+              </a:spcBef>
+            </a:pPr>
+            <a:r>
+              <a:rPr lang="en-US" sz="2000" b="1" i="1" dirty="0"/>
               <a:t>Observations</a:t>
             </a:r>
             <a:r>
-              <a:rPr lang="en-US" sz="2100" dirty="0"/>
+              <a:rPr lang="en-US" sz="2000" dirty="0"/>
               <a:t>:</a:t>
             </a:r>
           </a:p>
           <a:p>
-            <a:pPr lvl="2"/>
-            <a:r>
-              <a:rPr lang="en-US" sz="1700" dirty="0"/>
-              <a:t>Important Features: credit scores, payment frequencies, loanee age, (some) bank routing numbers, numeric payment info</a:t>
-            </a:r>
-          </a:p>
-          <a:p>
-            <a:pPr lvl="2"/>
-            <a:r>
-              <a:rPr lang="en-US" sz="1700" dirty="0"/>
-              <a:t>Unimportant Features: address zip codes, residence durations, email durations, (some) bank routing numbers, renting related features</a:t>
-            </a:r>
-          </a:p>
-          <a:p>
-            <a:endParaRPr lang="en-US" dirty="0"/>
+            <a:pPr lvl="2">
+              <a:spcBef>
+                <a:spcPts val="400"/>
+              </a:spcBef>
+            </a:pPr>
+            <a:r>
+              <a:rPr lang="en-US" dirty="0"/>
+              <a:t>Important Features: credit scores, income, payment frequencies, numeric payment info</a:t>
+            </a:r>
+          </a:p>
+          <a:p>
+            <a:pPr lvl="2">
+              <a:spcBef>
+                <a:spcPts val="400"/>
+              </a:spcBef>
+            </a:pPr>
+            <a:r>
+              <a:rPr lang="en-US" dirty="0"/>
+              <a:t>Unimportant Features: address zip codes, email durations, bank routing numbers</a:t>
+            </a:r>
           </a:p>
         </p:txBody>
       </p:sp>
       <p:pic>
         <p:nvPicPr>
-          <p:cNvPr id="7" name="Picture 6" descr="Table&#10;&#10;Description automatically generated with medium confidence">
+          <p:cNvPr id="9" name="Picture 8" descr="A picture containing text, screenshot, font, number&#10;&#10;Description automatically generated">
             <a:extLst>
               <a:ext uri="{FF2B5EF4-FFF2-40B4-BE49-F238E27FC236}">
-                <a16:creationId xmlns:a16="http://schemas.microsoft.com/office/drawing/2014/main" id="{32416E2C-1667-B99B-43FD-2B00F4EAE5B2}"/>
+                <a16:creationId xmlns:a16="http://schemas.microsoft.com/office/drawing/2014/main" id="{27458D10-7587-5C17-7DF3-BF2F259A672A}"/>
               </a:ext>
             </a:extLst>
           </p:cNvPr>
@@ -4907,8 +5158,8 @@
         </p:blipFill>
         <p:spPr>
           <a:xfrm>
-            <a:off x="3937000" y="2845914"/>
-            <a:ext cx="4318000" cy="1968500"/>
+            <a:off x="4084320" y="2752741"/>
+            <a:ext cx="4023360" cy="3017520"/>
           </a:xfrm>
           <a:prstGeom prst="rect">
             <a:avLst/>
@@ -4973,32 +5224,34 @@
           </a:xfrm>
         </p:spPr>
         <p:txBody>
-          <a:bodyPr/>
+          <a:bodyPr>
+            <a:normAutofit fontScale="90000"/>
+          </a:bodyPr>
           <a:lstStyle/>
           <a:p>
             <a:pPr algn="ctr"/>
             <a:r>
-              <a:rPr lang="en-US" b="1" dirty="0">
+              <a:rPr lang="en-US" sz="3200" b="1" dirty="0">
                 <a:latin typeface="Calibri" panose="020F0502020204030204" pitchFamily="34" charset="0"/>
                 <a:cs typeface="Calibri" panose="020F0502020204030204" pitchFamily="34" charset="0"/>
               </a:rPr>
               <a:t>Model </a:t>
             </a:r>
             <a:r>
-              <a:rPr lang="en-US" b="1" dirty="0" err="1">
+              <a:rPr lang="en-US" sz="3200" b="1" dirty="0" err="1">
                 <a:latin typeface="Calibri" panose="020F0502020204030204" pitchFamily="34" charset="0"/>
                 <a:cs typeface="Calibri" panose="020F0502020204030204" pitchFamily="34" charset="0"/>
               </a:rPr>
               <a:t>Explainability</a:t>
             </a:r>
             <a:r>
-              <a:rPr lang="en-US" b="1" dirty="0">
+              <a:rPr lang="en-US" sz="3200" b="1" dirty="0">
                 <a:latin typeface="Calibri" panose="020F0502020204030204" pitchFamily="34" charset="0"/>
                 <a:cs typeface="Calibri" panose="020F0502020204030204" pitchFamily="34" charset="0"/>
               </a:rPr>
               <a:t> - SHAP Values</a:t>
             </a:r>
-            <a:endParaRPr lang="en-US" dirty="0">
+            <a:endParaRPr lang="en-US" sz="3200" dirty="0">
               <a:latin typeface="Calibri" panose="020F0502020204030204" pitchFamily="34" charset="0"/>
               <a:cs typeface="Calibri" panose="020F0502020204030204" pitchFamily="34" charset="0"/>
             </a:endParaRPr>
@@ -5076,21 +5329,17 @@
             <a:pPr lvl="1"/>
             <a:r>
               <a:rPr lang="en-US" sz="1800" dirty="0"/>
-              <a:t>Older age led to higher output probabilities</a:t>
-            </a:r>
-          </a:p>
-          <a:p>
-            <a:pPr lvl="1"/>
-            <a:endParaRPr lang="en-US" dirty="0"/>
+              <a:t>Lower number of payments led to higher output probabilities</a:t>
+            </a:r>
           </a:p>
         </p:txBody>
       </p:sp>
       <p:pic>
         <p:nvPicPr>
-          <p:cNvPr id="5" name="Picture 4" descr="Graphical user interface, text&#10;&#10;Description automatically generated">
+          <p:cNvPr id="6" name="Picture 5" descr="A screen shot of a graph&#10;&#10;Description automatically generated with low confidence">
             <a:extLst>
               <a:ext uri="{FF2B5EF4-FFF2-40B4-BE49-F238E27FC236}">
-                <a16:creationId xmlns:a16="http://schemas.microsoft.com/office/drawing/2014/main" id="{CCE6A8D7-693E-0D45-F02C-1E49263C4873}"/>
+                <a16:creationId xmlns:a16="http://schemas.microsoft.com/office/drawing/2014/main" id="{A990644D-8EFA-0D74-A3FD-16FE606658A7}"/>
               </a:ext>
             </a:extLst>
           </p:cNvPr>
@@ -5107,15 +5356,12 @@
         </p:blipFill>
         <p:spPr>
           <a:xfrm>
-            <a:off x="7118682" y="1718650"/>
-            <a:ext cx="4235118" cy="5029200"/>
+            <a:off x="6630633" y="1819746"/>
+            <a:ext cx="4081111" cy="4846320"/>
           </a:xfrm>
           <a:prstGeom prst="rect">
             <a:avLst/>
           </a:prstGeom>
-          <a:solidFill>
-            <a:schemeClr val="bg1"/>
-          </a:solidFill>
           <a:ln>
             <a:solidFill>
               <a:schemeClr val="tx1"/>
@@ -5158,6 +5404,454 @@
           <p:cNvPr id="2" name="Title 1">
             <a:extLst>
               <a:ext uri="{FF2B5EF4-FFF2-40B4-BE49-F238E27FC236}">
+                <a16:creationId xmlns:a16="http://schemas.microsoft.com/office/drawing/2014/main" id="{3A469600-60D9-4DAA-7C48-86E5C9455F94}"/>
+              </a:ext>
+            </a:extLst>
+          </p:cNvPr>
+          <p:cNvSpPr>
+            <a:spLocks noGrp="1"/>
+          </p:cNvSpPr>
+          <p:nvPr>
+            <p:ph type="title"/>
+          </p:nvPr>
+        </p:nvSpPr>
+        <p:spPr>
+          <a:xfrm>
+            <a:off x="2231136" y="430538"/>
+            <a:ext cx="7729728" cy="1188720"/>
+          </a:xfrm>
+        </p:spPr>
+        <p:txBody>
+          <a:bodyPr/>
+          <a:lstStyle/>
+          <a:p>
+            <a:r>
+              <a:rPr lang="en-US" dirty="0" err="1"/>
+              <a:t>preprocessed_df</a:t>
+            </a:r>
+            <a:br>
+              <a:rPr lang="en-US" dirty="0"/>
+            </a:br>
+            <a:endParaRPr lang="en-US" dirty="0"/>
+          </a:p>
+        </p:txBody>
+      </p:sp>
+      <p:sp>
+        <p:nvSpPr>
+          <p:cNvPr id="3" name="Content Placeholder 2">
+            <a:extLst>
+              <a:ext uri="{FF2B5EF4-FFF2-40B4-BE49-F238E27FC236}">
+                <a16:creationId xmlns:a16="http://schemas.microsoft.com/office/drawing/2014/main" id="{3923563F-F720-4841-1980-DA22D8AFE39E}"/>
+              </a:ext>
+            </a:extLst>
+          </p:cNvPr>
+          <p:cNvSpPr>
+            <a:spLocks noGrp="1"/>
+          </p:cNvSpPr>
+          <p:nvPr>
+            <p:ph idx="1"/>
+          </p:nvPr>
+        </p:nvSpPr>
+        <p:spPr>
+          <a:xfrm>
+            <a:off x="2231136" y="2013355"/>
+            <a:ext cx="7729728" cy="3853291"/>
+          </a:xfrm>
+        </p:spPr>
+        <p:txBody>
+          <a:bodyPr/>
+          <a:lstStyle/>
+          <a:p>
+            <a:r>
+              <a:rPr lang="en-US" dirty="0"/>
+              <a:t>Utilized weights and biases to log/store the following training results and artifacts:</a:t>
+            </a:r>
+          </a:p>
+          <a:p>
+            <a:pPr lvl="1"/>
+            <a:r>
+              <a:rPr lang="en-US" dirty="0"/>
+              <a:t>Raw, intermediate and final datasets</a:t>
+            </a:r>
+          </a:p>
+          <a:p>
+            <a:pPr lvl="1"/>
+            <a:r>
+              <a:rPr lang="en-US" dirty="0"/>
+              <a:t>EDA analysis plots</a:t>
+            </a:r>
+          </a:p>
+          <a:p>
+            <a:pPr lvl="1"/>
+            <a:r>
+              <a:rPr lang="en-US" dirty="0"/>
+              <a:t>Best hyperparameter configuration</a:t>
+            </a:r>
+          </a:p>
+          <a:p>
+            <a:pPr lvl="1"/>
+            <a:r>
+              <a:rPr lang="en-US" dirty="0"/>
+              <a:t>Final trained model</a:t>
+            </a:r>
+          </a:p>
+          <a:p>
+            <a:pPr lvl="1"/>
+            <a:r>
+              <a:rPr lang="en-US" dirty="0"/>
+              <a:t>Raw/binarized model predictions for testing dataset</a:t>
+            </a:r>
+          </a:p>
+          <a:p>
+            <a:pPr lvl="1"/>
+            <a:r>
+              <a:rPr lang="en-US" dirty="0"/>
+              <a:t>Testing metrics (accuracy, F1,  ROC-AUC, Recall scores)</a:t>
+            </a:r>
+          </a:p>
+          <a:p>
+            <a:pPr lvl="1"/>
+            <a:r>
+              <a:rPr lang="en-US" dirty="0"/>
+              <a:t>Model analysis outputs (feature importance, ROC AUC, SHAP plots)</a:t>
+            </a:r>
+          </a:p>
+          <a:p>
+            <a:pPr lvl="1"/>
+            <a:endParaRPr lang="en-US" dirty="0"/>
+          </a:p>
+          <a:p>
+            <a:pPr lvl="1"/>
+            <a:endParaRPr lang="en-US" dirty="0"/>
+          </a:p>
+        </p:txBody>
+      </p:sp>
+      <p:sp>
+        <p:nvSpPr>
+          <p:cNvPr id="4" name="Title 1">
+            <a:extLst>
+              <a:ext uri="{FF2B5EF4-FFF2-40B4-BE49-F238E27FC236}">
+                <a16:creationId xmlns:a16="http://schemas.microsoft.com/office/drawing/2014/main" id="{56AA5DE2-F502-C3B4-DD0A-EBB1CE095C26}"/>
+              </a:ext>
+            </a:extLst>
+          </p:cNvPr>
+          <p:cNvSpPr txBox="1">
+            <a:spLocks/>
+          </p:cNvSpPr>
+          <p:nvPr/>
+        </p:nvSpPr>
+        <p:spPr bwMode="black">
+          <a:xfrm>
+            <a:off x="2231136" y="430538"/>
+            <a:ext cx="7729728" cy="1188720"/>
+          </a:xfrm>
+          <a:prstGeom prst="rect">
+            <a:avLst/>
+          </a:prstGeom>
+          <a:solidFill>
+            <a:srgbClr val="FFFFFF"/>
+          </a:solidFill>
+          <a:ln w="31750" cap="sq">
+            <a:solidFill>
+              <a:srgbClr val="404040"/>
+            </a:solidFill>
+            <a:miter lim="800000"/>
+          </a:ln>
+        </p:spPr>
+        <p:txBody>
+          <a:bodyPr vert="horz" lIns="182880" tIns="182880" rIns="182880" bIns="182880" rtlCol="0" anchor="ctr">
+            <a:normAutofit fontScale="97500"/>
+          </a:bodyPr>
+          <a:lstStyle>
+            <a:lvl1pPr algn="ctr" defTabSz="914400" rtl="0" eaLnBrk="1" latinLnBrk="0" hangingPunct="1">
+              <a:lnSpc>
+                <a:spcPct val="90000"/>
+              </a:lnSpc>
+              <a:spcBef>
+                <a:spcPct val="0"/>
+              </a:spcBef>
+              <a:buNone/>
+              <a:defRPr sz="2800" kern="1200" cap="all" spc="200" baseline="0">
+                <a:solidFill>
+                  <a:srgbClr val="262626"/>
+                </a:solidFill>
+                <a:latin typeface="+mj-lt"/>
+                <a:ea typeface="+mj-ea"/>
+                <a:cs typeface="+mj-cs"/>
+              </a:defRPr>
+            </a:lvl1pPr>
+          </a:lstStyle>
+          <a:p>
+            <a:r>
+              <a:rPr lang="en-US" sz="3200" b="1" dirty="0">
+                <a:latin typeface="Calibri" panose="020F0502020204030204" pitchFamily="34" charset="0"/>
+                <a:cs typeface="Calibri" panose="020F0502020204030204" pitchFamily="34" charset="0"/>
+              </a:rPr>
+              <a:t>Experiment Tracking</a:t>
+            </a:r>
+          </a:p>
+        </p:txBody>
+      </p:sp>
+      <p:sp>
+        <p:nvSpPr>
+          <p:cNvPr id="6" name="TextBox 5">
+            <a:extLst>
+              <a:ext uri="{FF2B5EF4-FFF2-40B4-BE49-F238E27FC236}">
+                <a16:creationId xmlns:a16="http://schemas.microsoft.com/office/drawing/2014/main" id="{DAD9678F-903B-6E40-3928-CA91C044E677}"/>
+              </a:ext>
+            </a:extLst>
+          </p:cNvPr>
+          <p:cNvSpPr txBox="1"/>
+          <p:nvPr/>
+        </p:nvSpPr>
+        <p:spPr>
+          <a:xfrm>
+            <a:off x="4827277" y="5686839"/>
+            <a:ext cx="2370227" cy="646331"/>
+          </a:xfrm>
+          <a:prstGeom prst="rect">
+            <a:avLst/>
+          </a:prstGeom>
+          <a:noFill/>
+        </p:spPr>
+        <p:txBody>
+          <a:bodyPr wrap="square">
+            <a:spAutoFit/>
+          </a:bodyPr>
+          <a:lstStyle/>
+          <a:p>
+            <a:pPr lvl="1" algn="ctr"/>
+            <a:r>
+              <a:rPr lang="en-US" dirty="0">
+                <a:hlinkClick r:id="rId2"/>
+              </a:rPr>
+              <a:t>WeightsAndBiases Overview</a:t>
+            </a:r>
+            <a:endParaRPr lang="en-US" dirty="0"/>
+          </a:p>
+        </p:txBody>
+      </p:sp>
+    </p:spTree>
+    <p:extLst>
+      <p:ext uri="{BB962C8B-B14F-4D97-AF65-F5344CB8AC3E}">
+        <p14:creationId xmlns:p14="http://schemas.microsoft.com/office/powerpoint/2010/main" val="2129789552"/>
+      </p:ext>
+    </p:extLst>
+  </p:cSld>
+  <p:clrMapOvr>
+    <a:masterClrMapping/>
+  </p:clrMapOvr>
+</p:sld>
+</file>
+
+<file path=ppt/slides/slide17.xml><?xml version="1.0" encoding="utf-8"?>
+<p:sld xmlns:a="http://schemas.openxmlformats.org/drawingml/2006/main" xmlns:r="http://schemas.openxmlformats.org/officeDocument/2006/relationships" xmlns:p="http://schemas.openxmlformats.org/presentationml/2006/main">
+  <p:cSld>
+    <p:spTree>
+      <p:nvGrpSpPr>
+        <p:cNvPr id="1" name=""/>
+        <p:cNvGrpSpPr/>
+        <p:nvPr/>
+      </p:nvGrpSpPr>
+      <p:grpSpPr>
+        <a:xfrm>
+          <a:off x="0" y="0"/>
+          <a:ext cx="0" cy="0"/>
+          <a:chOff x="0" y="0"/>
+          <a:chExt cx="0" cy="0"/>
+        </a:xfrm>
+      </p:grpSpPr>
+      <p:sp>
+        <p:nvSpPr>
+          <p:cNvPr id="3" name="Content Placeholder 2">
+            <a:extLst>
+              <a:ext uri="{FF2B5EF4-FFF2-40B4-BE49-F238E27FC236}">
+                <a16:creationId xmlns:a16="http://schemas.microsoft.com/office/drawing/2014/main" id="{D9CA2443-AD4F-866B-6B76-4DBBDFC91E1A}"/>
+              </a:ext>
+            </a:extLst>
+          </p:cNvPr>
+          <p:cNvSpPr>
+            <a:spLocks noGrp="1"/>
+          </p:cNvSpPr>
+          <p:nvPr>
+            <p:ph idx="1"/>
+          </p:nvPr>
+        </p:nvSpPr>
+        <p:spPr>
+          <a:xfrm>
+            <a:off x="2231136" y="2203478"/>
+            <a:ext cx="7729728" cy="3853290"/>
+          </a:xfrm>
+        </p:spPr>
+        <p:txBody>
+          <a:bodyPr>
+            <a:normAutofit lnSpcReduction="10000"/>
+          </a:bodyPr>
+          <a:lstStyle/>
+          <a:p>
+            <a:r>
+              <a:rPr lang="en-US" sz="2200" dirty="0"/>
+              <a:t>Unable to efficiently get “ground truth” label for production data that forms the basis of typical model monitoring data </a:t>
+            </a:r>
+          </a:p>
+          <a:p>
+            <a:pPr lvl="1"/>
+            <a:r>
+              <a:rPr lang="en-US" sz="1700" dirty="0"/>
+              <a:t>Loan repayments take many months or years</a:t>
+            </a:r>
+          </a:p>
+          <a:p>
+            <a:r>
+              <a:rPr lang="en-US" sz="2200" dirty="0"/>
+              <a:t>Use proxy for ground truth label</a:t>
+            </a:r>
+          </a:p>
+          <a:p>
+            <a:pPr lvl="1"/>
+            <a:r>
+              <a:rPr lang="en-US" sz="1700" dirty="0"/>
+              <a:t>Monitor the percentage of people who have made a late payment over the past month</a:t>
+            </a:r>
+          </a:p>
+          <a:p>
+            <a:pPr lvl="1"/>
+            <a:r>
+              <a:rPr lang="en-US" sz="1700" dirty="0"/>
+              <a:t>Dramatic increases or decreases can trigger a refresh of the model or signify the need to develop a completely new model	</a:t>
+            </a:r>
+          </a:p>
+          <a:p>
+            <a:r>
+              <a:rPr lang="en-US" sz="2200" dirty="0"/>
+              <a:t>Monitor prediction drift</a:t>
+            </a:r>
+          </a:p>
+          <a:p>
+            <a:pPr lvl="1"/>
+            <a:r>
+              <a:rPr lang="en-US" sz="1700" dirty="0"/>
+              <a:t>Utilize distribution distance metrics to quantify prediction drift (e.g., </a:t>
+            </a:r>
+            <a:r>
+              <a:rPr lang="en-US" sz="1700" dirty="0" err="1"/>
+              <a:t>Kullback-Leibler</a:t>
+            </a:r>
+            <a:r>
+              <a:rPr lang="en-US" sz="1700" dirty="0"/>
+              <a:t> Divergence, Population Stability Index (PSI))</a:t>
+            </a:r>
+          </a:p>
+          <a:p>
+            <a:pPr lvl="2"/>
+            <a:endParaRPr lang="en-US" sz="1700" dirty="0"/>
+          </a:p>
+          <a:p>
+            <a:endParaRPr lang="en-US" dirty="0"/>
+          </a:p>
+        </p:txBody>
+      </p:sp>
+      <p:sp>
+        <p:nvSpPr>
+          <p:cNvPr id="5" name="Title 1">
+            <a:extLst>
+              <a:ext uri="{FF2B5EF4-FFF2-40B4-BE49-F238E27FC236}">
+                <a16:creationId xmlns:a16="http://schemas.microsoft.com/office/drawing/2014/main" id="{9DEE5AAC-6AB4-65F2-D098-0C5C1C23CBE5}"/>
+              </a:ext>
+            </a:extLst>
+          </p:cNvPr>
+          <p:cNvSpPr txBox="1">
+            <a:spLocks/>
+          </p:cNvSpPr>
+          <p:nvPr/>
+        </p:nvSpPr>
+        <p:spPr bwMode="black">
+          <a:xfrm>
+            <a:off x="2231136" y="430538"/>
+            <a:ext cx="7729728" cy="1188720"/>
+          </a:xfrm>
+          <a:prstGeom prst="rect">
+            <a:avLst/>
+          </a:prstGeom>
+          <a:solidFill>
+            <a:srgbClr val="FFFFFF"/>
+          </a:solidFill>
+          <a:ln w="31750" cap="sq">
+            <a:solidFill>
+              <a:srgbClr val="404040"/>
+            </a:solidFill>
+            <a:miter lim="800000"/>
+          </a:ln>
+        </p:spPr>
+        <p:txBody>
+          <a:bodyPr vert="horz" lIns="182880" tIns="182880" rIns="182880" bIns="182880" rtlCol="0" anchor="ctr">
+            <a:normAutofit fontScale="97500"/>
+          </a:bodyPr>
+          <a:lstStyle>
+            <a:lvl1pPr algn="ctr" defTabSz="914400" rtl="0" eaLnBrk="1" latinLnBrk="0" hangingPunct="1">
+              <a:lnSpc>
+                <a:spcPct val="90000"/>
+              </a:lnSpc>
+              <a:spcBef>
+                <a:spcPct val="0"/>
+              </a:spcBef>
+              <a:buNone/>
+              <a:defRPr sz="2800" kern="1200" cap="all" spc="200" baseline="0">
+                <a:solidFill>
+                  <a:srgbClr val="262626"/>
+                </a:solidFill>
+                <a:latin typeface="+mj-lt"/>
+                <a:ea typeface="+mj-ea"/>
+                <a:cs typeface="+mj-cs"/>
+              </a:defRPr>
+            </a:lvl1pPr>
+          </a:lstStyle>
+          <a:p>
+            <a:r>
+              <a:rPr lang="en-US" sz="3200" b="1" dirty="0">
+                <a:latin typeface="Calibri" panose="020F0502020204030204" pitchFamily="34" charset="0"/>
+                <a:cs typeface="Calibri" panose="020F0502020204030204" pitchFamily="34" charset="0"/>
+              </a:rPr>
+              <a:t>Model Monitoring</a:t>
+            </a:r>
+          </a:p>
+        </p:txBody>
+      </p:sp>
+    </p:spTree>
+    <p:extLst>
+      <p:ext uri="{BB962C8B-B14F-4D97-AF65-F5344CB8AC3E}">
+        <p14:creationId xmlns:p14="http://schemas.microsoft.com/office/powerpoint/2010/main" val="3675864534"/>
+      </p:ext>
+    </p:extLst>
+  </p:cSld>
+  <p:clrMapOvr>
+    <a:masterClrMapping/>
+  </p:clrMapOvr>
+</p:sld>
+</file>
+
+<file path=ppt/slides/slide18.xml><?xml version="1.0" encoding="utf-8"?>
+<p:sld xmlns:a="http://schemas.openxmlformats.org/drawingml/2006/main" xmlns:r="http://schemas.openxmlformats.org/officeDocument/2006/relationships" xmlns:p="http://schemas.openxmlformats.org/presentationml/2006/main">
+  <p:cSld>
+    <p:spTree>
+      <p:nvGrpSpPr>
+        <p:cNvPr id="1" name=""/>
+        <p:cNvGrpSpPr/>
+        <p:nvPr/>
+      </p:nvGrpSpPr>
+      <p:grpSpPr>
+        <a:xfrm>
+          <a:off x="0" y="0"/>
+          <a:ext cx="0" cy="0"/>
+          <a:chOff x="0" y="0"/>
+          <a:chExt cx="0" cy="0"/>
+        </a:xfrm>
+      </p:grpSpPr>
+      <p:sp>
+        <p:nvSpPr>
+          <p:cNvPr id="2" name="Title 1">
+            <a:extLst>
+              <a:ext uri="{FF2B5EF4-FFF2-40B4-BE49-F238E27FC236}">
                 <a16:creationId xmlns:a16="http://schemas.microsoft.com/office/drawing/2014/main" id="{2A0C95D4-FF75-45E3-E578-0E5CA7614B21}"/>
               </a:ext>
             </a:extLst>
@@ -5176,12 +5870,14 @@
           </a:xfrm>
         </p:spPr>
         <p:txBody>
-          <a:bodyPr/>
+          <a:bodyPr>
+            <a:normAutofit/>
+          </a:bodyPr>
           <a:lstStyle/>
           <a:p>
             <a:pPr algn="ctr"/>
             <a:r>
-              <a:rPr lang="en-US" b="1" dirty="0">
+              <a:rPr lang="en-US" sz="3200" b="1" dirty="0">
                 <a:latin typeface="Calibri" panose="020F0502020204030204" pitchFamily="34" charset="0"/>
                 <a:cs typeface="Calibri" panose="020F0502020204030204" pitchFamily="34" charset="0"/>
               </a:rPr>
@@ -5214,7 +5910,7 @@
         </p:spPr>
         <p:txBody>
           <a:bodyPr>
-            <a:normAutofit fontScale="92500" lnSpcReduction="10000"/>
+            <a:normAutofit/>
           </a:bodyPr>
           <a:lstStyle/>
           <a:p>
@@ -5226,9 +5922,15 @@
           <a:p>
             <a:pPr lvl="1"/>
             <a:r>
+              <a:rPr lang="en-US" dirty="0"/>
+              <a:t>Only contained approved loans; an actual in-production model will encounter loans that will be denied</a:t>
+            </a:r>
+          </a:p>
+          <a:p>
+            <a:pPr lvl="1"/>
+            <a:r>
               <a:rPr lang="en-US" i="0" dirty="0">
                 <a:effectLst/>
-                <a:latin typeface="-apple-system"/>
               </a:rPr>
               <a:t>Small sample size</a:t>
             </a:r>
@@ -5246,39 +5948,6 @@
             <a:r>
               <a:rPr lang="en-US" dirty="0"/>
               <a:t>No macro-economic factors</a:t>
-            </a:r>
-          </a:p>
-          <a:p>
-            <a:r>
-              <a:rPr lang="en-US" dirty="0"/>
-              <a:t>Target feature proxy</a:t>
-            </a:r>
-          </a:p>
-          <a:p>
-            <a:pPr lvl="1"/>
-            <a:r>
-              <a:rPr lang="en-US" dirty="0"/>
-              <a:t>Our training data’s target is whether an approved loan was good or bad</a:t>
-            </a:r>
-          </a:p>
-          <a:p>
-            <a:pPr lvl="1"/>
-            <a:r>
-              <a:rPr lang="en-US" dirty="0"/>
-              <a:t>This serves as a proxy for our desired target, which is if a loan should be approved or not</a:t>
-            </a:r>
-          </a:p>
-          <a:p>
-            <a:r>
-              <a:rPr lang="en-US" dirty="0"/>
-              <a:t>Sample population</a:t>
-            </a:r>
-          </a:p>
-          <a:p>
-            <a:pPr lvl="1"/>
-            <a:r>
-              <a:rPr lang="en-US" dirty="0"/>
-              <a:t>Only contained approved loans; an actual in-production model will encounter loans that will be denied</a:t>
             </a:r>
           </a:p>
           <a:p>
@@ -5307,6 +5976,143 @@
     <p:extLst>
       <p:ext uri="{BB962C8B-B14F-4D97-AF65-F5344CB8AC3E}">
         <p14:creationId xmlns:p14="http://schemas.microsoft.com/office/powerpoint/2010/main" val="3844663739"/>
+      </p:ext>
+    </p:extLst>
+  </p:cSld>
+  <p:clrMapOvr>
+    <a:masterClrMapping/>
+  </p:clrMapOvr>
+</p:sld>
+</file>
+
+<file path=ppt/slides/slide19.xml><?xml version="1.0" encoding="utf-8"?>
+<p:sld xmlns:a="http://schemas.openxmlformats.org/drawingml/2006/main" xmlns:r="http://schemas.openxmlformats.org/officeDocument/2006/relationships" xmlns:p="http://schemas.openxmlformats.org/presentationml/2006/main">
+  <p:cSld>
+    <p:spTree>
+      <p:nvGrpSpPr>
+        <p:cNvPr id="1" name=""/>
+        <p:cNvGrpSpPr/>
+        <p:nvPr/>
+      </p:nvGrpSpPr>
+      <p:grpSpPr>
+        <a:xfrm>
+          <a:off x="0" y="0"/>
+          <a:ext cx="0" cy="0"/>
+          <a:chOff x="0" y="0"/>
+          <a:chExt cx="0" cy="0"/>
+        </a:xfrm>
+      </p:grpSpPr>
+      <p:sp>
+        <p:nvSpPr>
+          <p:cNvPr id="3" name="Content Placeholder 2">
+            <a:extLst>
+              <a:ext uri="{FF2B5EF4-FFF2-40B4-BE49-F238E27FC236}">
+                <a16:creationId xmlns:a16="http://schemas.microsoft.com/office/drawing/2014/main" id="{1089F52D-D04A-676D-F458-5EE40B8169A4}"/>
+              </a:ext>
+            </a:extLst>
+          </p:cNvPr>
+          <p:cNvSpPr>
+            <a:spLocks noGrp="1"/>
+          </p:cNvSpPr>
+          <p:nvPr>
+            <p:ph idx="1"/>
+          </p:nvPr>
+        </p:nvSpPr>
+        <p:spPr>
+          <a:xfrm>
+            <a:off x="2231136" y="2619937"/>
+            <a:ext cx="7729728" cy="3101983"/>
+          </a:xfrm>
+        </p:spPr>
+        <p:txBody>
+          <a:bodyPr>
+            <a:normAutofit/>
+          </a:bodyPr>
+          <a:lstStyle/>
+          <a:p>
+            <a:pPr marL="0" indent="0" algn="ctr">
+              <a:buNone/>
+            </a:pPr>
+            <a:r>
+              <a:rPr lang="en-US" sz="2000" b="1" dirty="0">
+                <a:hlinkClick r:id="rId3"/>
+              </a:rPr>
+              <a:t>Project Github</a:t>
+            </a:r>
+            <a:endParaRPr lang="en-US" sz="2000" b="1" dirty="0"/>
+          </a:p>
+        </p:txBody>
+      </p:sp>
+      <p:sp>
+        <p:nvSpPr>
+          <p:cNvPr id="4" name="Title 1">
+            <a:extLst>
+              <a:ext uri="{FF2B5EF4-FFF2-40B4-BE49-F238E27FC236}">
+                <a16:creationId xmlns:a16="http://schemas.microsoft.com/office/drawing/2014/main" id="{651C4E15-6DE1-ECD6-F4B6-5F22654B9660}"/>
+              </a:ext>
+            </a:extLst>
+          </p:cNvPr>
+          <p:cNvSpPr txBox="1">
+            <a:spLocks/>
+          </p:cNvSpPr>
+          <p:nvPr/>
+        </p:nvSpPr>
+        <p:spPr bwMode="black">
+          <a:xfrm>
+            <a:off x="2231136" y="349057"/>
+            <a:ext cx="7729728" cy="1188720"/>
+          </a:xfrm>
+          <a:prstGeom prst="rect">
+            <a:avLst/>
+          </a:prstGeom>
+          <a:solidFill>
+            <a:srgbClr val="FFFFFF"/>
+          </a:solidFill>
+          <a:ln w="31750" cap="sq">
+            <a:solidFill>
+              <a:srgbClr val="404040"/>
+            </a:solidFill>
+            <a:miter lim="800000"/>
+          </a:ln>
+        </p:spPr>
+        <p:txBody>
+          <a:bodyPr vert="horz" lIns="182880" tIns="182880" rIns="182880" bIns="182880" rtlCol="0" anchor="ctr">
+            <a:normAutofit fontScale="97500"/>
+          </a:bodyPr>
+          <a:lstStyle>
+            <a:lvl1pPr algn="ctr" defTabSz="914400" rtl="0" eaLnBrk="1" latinLnBrk="0" hangingPunct="1">
+              <a:lnSpc>
+                <a:spcPct val="90000"/>
+              </a:lnSpc>
+              <a:spcBef>
+                <a:spcPct val="0"/>
+              </a:spcBef>
+              <a:buNone/>
+              <a:defRPr sz="2800" kern="1200" cap="all" spc="200" baseline="0">
+                <a:solidFill>
+                  <a:srgbClr val="262626"/>
+                </a:solidFill>
+                <a:latin typeface="+mj-lt"/>
+                <a:ea typeface="+mj-ea"/>
+                <a:cs typeface="+mj-cs"/>
+              </a:defRPr>
+            </a:lvl1pPr>
+          </a:lstStyle>
+          <a:p>
+            <a:r>
+              <a:rPr lang="en-US" sz="3200" b="1" dirty="0">
+                <a:latin typeface="Calibri" panose="020F0502020204030204" pitchFamily="34" charset="0"/>
+                <a:cs typeface="Calibri" panose="020F0502020204030204" pitchFamily="34" charset="0"/>
+              </a:rPr>
+              <a:t>Project Code</a:t>
+            </a:r>
+          </a:p>
+        </p:txBody>
+      </p:sp>
+    </p:spTree>
+    <p:extLst>
+      <p:ext uri="{BB962C8B-B14F-4D97-AF65-F5344CB8AC3E}">
+        <p14:creationId xmlns:p14="http://schemas.microsoft.com/office/powerpoint/2010/main" val="1378345970"/>
       </p:ext>
     </p:extLst>
   </p:cSld>
@@ -5356,12 +6162,14 @@
           </a:xfrm>
         </p:spPr>
         <p:txBody>
-          <a:bodyPr/>
+          <a:bodyPr>
+            <a:normAutofit/>
+          </a:bodyPr>
           <a:lstStyle/>
           <a:p>
             <a:pPr algn="ctr"/>
             <a:r>
-              <a:rPr lang="en-US" b="1" dirty="0">
+              <a:rPr lang="en-US" sz="3200" b="1" dirty="0">
                 <a:latin typeface="Calibri" panose="020F0502020204030204" pitchFamily="34" charset="0"/>
                 <a:cs typeface="Calibri" panose="020F0502020204030204" pitchFamily="34" charset="0"/>
               </a:rPr>
@@ -5394,7 +6202,7 @@
         </p:spPr>
         <p:txBody>
           <a:bodyPr>
-            <a:normAutofit lnSpcReduction="10000"/>
+            <a:normAutofit/>
           </a:bodyPr>
           <a:lstStyle/>
           <a:p>
@@ -5453,7 +6261,7 @@
             <a:pPr lvl="2"/>
             <a:r>
               <a:rPr lang="en-US" sz="1400" dirty="0"/>
-              <a:t>Input features: Provided application data </a:t>
+              <a:t>Input features: Application data</a:t>
             </a:r>
           </a:p>
           <a:p>
@@ -5461,13 +6269,6 @@
             <a:r>
               <a:rPr lang="en-US" sz="1400" dirty="0"/>
               <a:t>Target feature: Loan performance indicator </a:t>
-            </a:r>
-          </a:p>
-          <a:p>
-            <a:pPr lvl="3"/>
-            <a:r>
-              <a:rPr lang="en-US" sz="1400" dirty="0"/>
-              <a:t>Note: Loan performance will serve as a proxy for an approval feature (further discussed in limitations slide)</a:t>
             </a:r>
           </a:p>
           <a:p>
@@ -5539,12 +6340,14 @@
           </a:xfrm>
         </p:spPr>
         <p:txBody>
-          <a:bodyPr/>
+          <a:bodyPr>
+            <a:normAutofit/>
+          </a:bodyPr>
           <a:lstStyle/>
           <a:p>
             <a:pPr algn="ctr"/>
             <a:r>
-              <a:rPr lang="en-US" b="1" dirty="0">
+              <a:rPr lang="en-US" sz="3200" b="1" dirty="0">
                 <a:latin typeface="Calibri" panose="020F0502020204030204" pitchFamily="34" charset="0"/>
                 <a:cs typeface="Calibri" panose="020F0502020204030204" pitchFamily="34" charset="0"/>
               </a:rPr>
@@ -5736,12 +6539,16 @@
           <a:p>
             <a:pPr algn="ctr"/>
             <a:r>
-              <a:rPr lang="en-US" b="1" dirty="0">
+              <a:rPr lang="en-US" sz="3200" b="1" dirty="0">
                 <a:latin typeface="Calibri" panose="020F0502020204030204" pitchFamily="34" charset="0"/>
                 <a:cs typeface="Calibri" panose="020F0502020204030204" pitchFamily="34" charset="0"/>
               </a:rPr>
               <a:t>Data</a:t>
             </a:r>
+            <a:endParaRPr lang="en-US" b="1" dirty="0">
+              <a:latin typeface="Calibri" panose="020F0502020204030204" pitchFamily="34" charset="0"/>
+              <a:cs typeface="Calibri" panose="020F0502020204030204" pitchFamily="34" charset="0"/>
+            </a:endParaRPr>
           </a:p>
         </p:txBody>
       </p:sp>
@@ -5763,8 +6570,8 @@
         </p:nvSpPr>
         <p:spPr>
           <a:xfrm>
-            <a:off x="2231136" y="1815922"/>
-            <a:ext cx="7729728" cy="4903659"/>
+            <a:off x="896323" y="1784390"/>
+            <a:ext cx="5199677" cy="4742534"/>
           </a:xfrm>
         </p:spPr>
         <p:txBody>
@@ -5773,131 +6580,488 @@
           </a:bodyPr>
           <a:lstStyle/>
           <a:p>
-            <a:r>
-              <a:rPr lang="en-US" sz="1400" b="1" i="1" dirty="0"/>
-              <a:t>Volume</a:t>
+            <a:pPr>
+              <a:spcBef>
+                <a:spcPts val="400"/>
+              </a:spcBef>
+            </a:pPr>
+            <a:r>
+              <a:rPr lang="en-US" b="1" i="1" dirty="0"/>
+              <a:t>Form</a:t>
+            </a:r>
+          </a:p>
+          <a:p>
+            <a:pPr lvl="1">
+              <a:spcBef>
+                <a:spcPts val="400"/>
+              </a:spcBef>
+            </a:pPr>
+            <a:r>
+              <a:rPr lang="en-US" dirty="0"/>
+              <a:t>2 datasets provided: </a:t>
+            </a:r>
+          </a:p>
+          <a:p>
+            <a:pPr lvl="2">
+              <a:spcBef>
+                <a:spcPts val="400"/>
+              </a:spcBef>
+            </a:pPr>
+            <a:r>
+              <a:rPr lang="en-US" dirty="0"/>
+              <a:t>Application data,  Loan quality indicator data</a:t>
+            </a:r>
+          </a:p>
+          <a:p>
+            <a:pPr lvl="2">
+              <a:spcBef>
+                <a:spcPts val="400"/>
+              </a:spcBef>
+            </a:pPr>
+            <a:r>
+              <a:rPr lang="en-US" dirty="0"/>
+              <a:t>Merge key: </a:t>
+            </a:r>
+            <a:r>
+              <a:rPr lang="en-US" dirty="0" err="1"/>
+              <a:t>CustomerId</a:t>
+            </a:r>
+            <a:endParaRPr lang="en-US" dirty="0"/>
+          </a:p>
+          <a:p>
+            <a:pPr>
+              <a:spcBef>
+                <a:spcPts val="400"/>
+              </a:spcBef>
+            </a:pPr>
+            <a:r>
+              <a:rPr lang="en-US" b="1" i="1" dirty="0"/>
+              <a:t>Volume (after merge)</a:t>
+            </a:r>
+          </a:p>
+          <a:p>
+            <a:pPr lvl="1">
+              <a:spcBef>
+                <a:spcPts val="400"/>
+              </a:spcBef>
+            </a:pPr>
+            <a:r>
+              <a:rPr lang="en-US" dirty="0"/>
+              <a:t>650 samples, 33 features</a:t>
+            </a:r>
+            <a:endParaRPr lang="en-US" sz="1800" dirty="0"/>
+          </a:p>
+          <a:p>
+            <a:pPr>
+              <a:spcBef>
+                <a:spcPts val="400"/>
+              </a:spcBef>
+            </a:pPr>
+            <a:r>
+              <a:rPr lang="en-US" b="1" i="1" dirty="0"/>
+              <a:t>Features</a:t>
+            </a:r>
+          </a:p>
+          <a:p>
+            <a:pPr lvl="1">
+              <a:spcBef>
+                <a:spcPts val="400"/>
+              </a:spcBef>
+            </a:pPr>
+            <a:r>
+              <a:rPr lang="en-US" dirty="0"/>
+              <a:t>Customer Specific Information</a:t>
+            </a:r>
+          </a:p>
+          <a:p>
+            <a:pPr lvl="2">
+              <a:spcBef>
+                <a:spcPts val="400"/>
+              </a:spcBef>
+            </a:pPr>
+            <a:r>
+              <a:rPr lang="en-US" i="1" dirty="0"/>
+              <a:t>General</a:t>
+            </a:r>
+            <a:r>
+              <a:rPr lang="en-US" dirty="0"/>
+              <a:t>: Birth date, owns or rents residence, address zip code, email, etc.</a:t>
+            </a:r>
+          </a:p>
+          <a:p>
+            <a:pPr lvl="2">
+              <a:spcBef>
+                <a:spcPts val="400"/>
+              </a:spcBef>
+            </a:pPr>
+            <a:r>
+              <a:rPr lang="en-US" i="1" dirty="0"/>
+              <a:t>Duration/Frequency</a:t>
+            </a:r>
+            <a:r>
+              <a:rPr lang="en-US" dirty="0"/>
+              <a:t>: Residence duration, bank account duration, etc.</a:t>
+            </a:r>
+          </a:p>
+          <a:p>
+            <a:pPr lvl="2">
+              <a:spcBef>
+                <a:spcPts val="400"/>
+              </a:spcBef>
+            </a:pPr>
+            <a:r>
+              <a:rPr lang="en-US" i="1" dirty="0"/>
+              <a:t>Credit History</a:t>
+            </a:r>
+            <a:r>
+              <a:rPr lang="en-US" dirty="0"/>
+              <a:t>: Link2Credit score, FICO scores</a:t>
+            </a:r>
+          </a:p>
+          <a:p>
+            <a:pPr lvl="1">
+              <a:spcBef>
+                <a:spcPts val="400"/>
+              </a:spcBef>
+            </a:pPr>
+            <a:r>
+              <a:rPr lang="en-US" dirty="0"/>
+              <a:t>Loan Specific Information:</a:t>
+            </a:r>
+          </a:p>
+          <a:p>
+            <a:pPr lvl="2">
+              <a:spcBef>
+                <a:spcPts val="400"/>
+              </a:spcBef>
+            </a:pPr>
+            <a:r>
+              <a:rPr lang="en-US" dirty="0"/>
+              <a:t>Amount requested, payment frequency, loan duration, application submit date, etc.</a:t>
+            </a:r>
+          </a:p>
+        </p:txBody>
+      </p:sp>
+      <p:sp>
+        <p:nvSpPr>
+          <p:cNvPr id="4" name="Content Placeholder 2">
+            <a:extLst>
+              <a:ext uri="{FF2B5EF4-FFF2-40B4-BE49-F238E27FC236}">
+                <a16:creationId xmlns:a16="http://schemas.microsoft.com/office/drawing/2014/main" id="{D284297F-53FE-62E1-D792-BA70F0074DF2}"/>
+              </a:ext>
+            </a:extLst>
+          </p:cNvPr>
+          <p:cNvSpPr txBox="1">
+            <a:spLocks/>
+          </p:cNvSpPr>
+          <p:nvPr/>
+        </p:nvSpPr>
+        <p:spPr>
+          <a:xfrm>
+            <a:off x="6096000" y="1952263"/>
+            <a:ext cx="5199677" cy="4742534"/>
+          </a:xfrm>
+          <a:prstGeom prst="rect">
+            <a:avLst/>
+          </a:prstGeom>
+        </p:spPr>
+        <p:txBody>
+          <a:bodyPr vert="horz" lIns="91440" tIns="45720" rIns="91440" bIns="45720" rtlCol="0">
+            <a:noAutofit/>
+          </a:bodyPr>
+          <a:lstStyle>
+            <a:lvl1pPr marL="228600" indent="-228600" algn="l" defTabSz="914400" rtl="0" eaLnBrk="1" latinLnBrk="0" hangingPunct="1">
+              <a:lnSpc>
+                <a:spcPct val="100000"/>
+              </a:lnSpc>
+              <a:spcBef>
+                <a:spcPts val="1000"/>
+              </a:spcBef>
+              <a:buClr>
+                <a:schemeClr val="accent2"/>
+              </a:buClr>
+              <a:buFont typeface="Arial" panose="020B0604020202020204" pitchFamily="34" charset="0"/>
+              <a:buChar char="•"/>
+              <a:defRPr sz="1800" kern="1200">
+                <a:solidFill>
+                  <a:schemeClr val="tx1">
+                    <a:lumMod val="85000"/>
+                    <a:lumOff val="15000"/>
+                  </a:schemeClr>
+                </a:solidFill>
+                <a:latin typeface="+mn-lt"/>
+                <a:ea typeface="+mn-ea"/>
+                <a:cs typeface="+mn-cs"/>
+              </a:defRPr>
+            </a:lvl1pPr>
+            <a:lvl2pPr marL="457200" indent="-228600" algn="l" defTabSz="914400" rtl="0" eaLnBrk="1" latinLnBrk="0" hangingPunct="1">
+              <a:lnSpc>
+                <a:spcPct val="100000"/>
+              </a:lnSpc>
+              <a:spcBef>
+                <a:spcPts val="1000"/>
+              </a:spcBef>
+              <a:buClr>
+                <a:schemeClr val="accent2"/>
+              </a:buClr>
+              <a:buFont typeface="Arial" panose="020B0604020202020204" pitchFamily="34" charset="0"/>
+              <a:buChar char="•"/>
+              <a:defRPr sz="1600" kern="1200">
+                <a:solidFill>
+                  <a:schemeClr val="tx1">
+                    <a:lumMod val="85000"/>
+                    <a:lumOff val="15000"/>
+                  </a:schemeClr>
+                </a:solidFill>
+                <a:latin typeface="+mn-lt"/>
+                <a:ea typeface="+mn-ea"/>
+                <a:cs typeface="+mn-cs"/>
+              </a:defRPr>
+            </a:lvl2pPr>
+            <a:lvl3pPr marL="685800" indent="-228600" algn="l" defTabSz="914400" rtl="0" eaLnBrk="1" latinLnBrk="0" hangingPunct="1">
+              <a:lnSpc>
+                <a:spcPct val="100000"/>
+              </a:lnSpc>
+              <a:spcBef>
+                <a:spcPts val="1000"/>
+              </a:spcBef>
+              <a:buClr>
+                <a:schemeClr val="accent2"/>
+              </a:buClr>
+              <a:buFont typeface="Arial" panose="020B0604020202020204" pitchFamily="34" charset="0"/>
+              <a:buChar char="•"/>
+              <a:defRPr sz="1600" kern="1200">
+                <a:solidFill>
+                  <a:schemeClr val="tx1">
+                    <a:lumMod val="85000"/>
+                    <a:lumOff val="15000"/>
+                  </a:schemeClr>
+                </a:solidFill>
+                <a:latin typeface="+mn-lt"/>
+                <a:ea typeface="+mn-ea"/>
+                <a:cs typeface="+mn-cs"/>
+              </a:defRPr>
+            </a:lvl3pPr>
+            <a:lvl4pPr marL="914400" indent="-228600" algn="l" defTabSz="914400" rtl="0" eaLnBrk="1" latinLnBrk="0" hangingPunct="1">
+              <a:lnSpc>
+                <a:spcPct val="100000"/>
+              </a:lnSpc>
+              <a:spcBef>
+                <a:spcPts val="1000"/>
+              </a:spcBef>
+              <a:buClr>
+                <a:schemeClr val="accent2"/>
+              </a:buClr>
+              <a:buFont typeface="Arial" panose="020B0604020202020204" pitchFamily="34" charset="0"/>
+              <a:buChar char="•"/>
+              <a:defRPr sz="1600" kern="1200">
+                <a:solidFill>
+                  <a:schemeClr val="tx1">
+                    <a:lumMod val="85000"/>
+                    <a:lumOff val="15000"/>
+                  </a:schemeClr>
+                </a:solidFill>
+                <a:latin typeface="+mn-lt"/>
+                <a:ea typeface="+mn-ea"/>
+                <a:cs typeface="+mn-cs"/>
+              </a:defRPr>
+            </a:lvl4pPr>
+            <a:lvl5pPr marL="1143000" indent="-228600" algn="l" defTabSz="914400" rtl="0" eaLnBrk="1" latinLnBrk="0" hangingPunct="1">
+              <a:lnSpc>
+                <a:spcPct val="100000"/>
+              </a:lnSpc>
+              <a:spcBef>
+                <a:spcPts val="1000"/>
+              </a:spcBef>
+              <a:buClr>
+                <a:schemeClr val="accent2"/>
+              </a:buClr>
+              <a:buFont typeface="Arial" panose="020B0604020202020204" pitchFamily="34" charset="0"/>
+              <a:buChar char="•"/>
+              <a:defRPr sz="1600" kern="1200">
+                <a:solidFill>
+                  <a:schemeClr val="tx1">
+                    <a:lumMod val="85000"/>
+                    <a:lumOff val="15000"/>
+                  </a:schemeClr>
+                </a:solidFill>
+                <a:latin typeface="+mn-lt"/>
+                <a:ea typeface="+mn-ea"/>
+                <a:cs typeface="+mn-cs"/>
+              </a:defRPr>
+            </a:lvl5pPr>
+            <a:lvl6pPr marL="1312863" indent="-228600" algn="l" defTabSz="914400" rtl="0" eaLnBrk="1" latinLnBrk="0" hangingPunct="1">
+              <a:lnSpc>
+                <a:spcPct val="100000"/>
+              </a:lnSpc>
+              <a:spcBef>
+                <a:spcPts val="1000"/>
+              </a:spcBef>
+              <a:buClr>
+                <a:schemeClr val="accent2"/>
+              </a:buClr>
+              <a:buFont typeface="Arial" panose="020B0604020202020204" pitchFamily="34" charset="0"/>
+              <a:buChar char="•"/>
+              <a:defRPr sz="1600" kern="1200">
+                <a:solidFill>
+                  <a:schemeClr val="tx1"/>
+                </a:solidFill>
+                <a:latin typeface="+mn-lt"/>
+                <a:ea typeface="+mn-ea"/>
+                <a:cs typeface="+mn-cs"/>
+              </a:defRPr>
+            </a:lvl6pPr>
+            <a:lvl7pPr marL="1484313" indent="-228600" algn="l" defTabSz="914400" rtl="0" eaLnBrk="1" latinLnBrk="0" hangingPunct="1">
+              <a:lnSpc>
+                <a:spcPct val="100000"/>
+              </a:lnSpc>
+              <a:spcBef>
+                <a:spcPts val="1000"/>
+              </a:spcBef>
+              <a:buClr>
+                <a:schemeClr val="accent2"/>
+              </a:buClr>
+              <a:buFont typeface="Arial" panose="020B0604020202020204" pitchFamily="34" charset="0"/>
+              <a:buChar char="•"/>
+              <a:defRPr sz="1600" kern="1200">
+                <a:solidFill>
+                  <a:schemeClr val="tx1"/>
+                </a:solidFill>
+                <a:latin typeface="+mn-lt"/>
+                <a:ea typeface="+mn-ea"/>
+                <a:cs typeface="+mn-cs"/>
+              </a:defRPr>
+            </a:lvl7pPr>
+            <a:lvl8pPr marL="1657350" indent="-228600" algn="l" defTabSz="914400" rtl="0" eaLnBrk="1" latinLnBrk="0" hangingPunct="1">
+              <a:lnSpc>
+                <a:spcPct val="100000"/>
+              </a:lnSpc>
+              <a:spcBef>
+                <a:spcPts val="1000"/>
+              </a:spcBef>
+              <a:buClr>
+                <a:schemeClr val="accent2"/>
+              </a:buClr>
+              <a:buFont typeface="Arial" panose="020B0604020202020204" pitchFamily="34" charset="0"/>
+              <a:buChar char="•"/>
+              <a:defRPr sz="1600" kern="1200" baseline="0">
+                <a:solidFill>
+                  <a:schemeClr val="tx1"/>
+                </a:solidFill>
+                <a:latin typeface="+mn-lt"/>
+                <a:ea typeface="+mn-ea"/>
+                <a:cs typeface="+mn-cs"/>
+              </a:defRPr>
+            </a:lvl8pPr>
+            <a:lvl9pPr marL="1882775" indent="-228600" algn="l" defTabSz="914400" rtl="0" eaLnBrk="1" latinLnBrk="0" hangingPunct="1">
+              <a:lnSpc>
+                <a:spcPct val="100000"/>
+              </a:lnSpc>
+              <a:spcBef>
+                <a:spcPts val="1000"/>
+              </a:spcBef>
+              <a:buClr>
+                <a:schemeClr val="accent2"/>
+              </a:buClr>
+              <a:buFont typeface="Arial" panose="020B0604020202020204" pitchFamily="34" charset="0"/>
+              <a:buChar char="•"/>
+              <a:defRPr sz="1600" kern="1200" baseline="0">
+                <a:solidFill>
+                  <a:schemeClr val="tx1"/>
+                </a:solidFill>
+                <a:latin typeface="+mn-lt"/>
+                <a:ea typeface="+mn-ea"/>
+                <a:cs typeface="+mn-cs"/>
+              </a:defRPr>
+            </a:lvl9pPr>
+          </a:lstStyle>
+          <a:p>
+            <a:r>
+              <a:rPr lang="en-US" b="1" i="1" dirty="0"/>
+              <a:t>Notes/Limitations</a:t>
+            </a:r>
+            <a:r>
+              <a:rPr lang="en-US" dirty="0"/>
+              <a:t>:</a:t>
             </a:r>
           </a:p>
           <a:p>
             <a:pPr lvl="1"/>
             <a:r>
-              <a:rPr lang="en-US" sz="1200" dirty="0"/>
-              <a:t>650 samples, 33 features</a:t>
-            </a:r>
-            <a:endParaRPr lang="en-US" sz="1400" dirty="0"/>
-          </a:p>
-          <a:p>
-            <a:r>
-              <a:rPr lang="en-US" sz="1400" b="1" i="1" dirty="0"/>
-              <a:t>Features</a:t>
+              <a:rPr lang="en-US" dirty="0"/>
+              <a:t>Application data only from approved loans</a:t>
+            </a:r>
+          </a:p>
+          <a:p>
+            <a:pPr lvl="2"/>
+            <a:r>
+              <a:rPr lang="en-US" dirty="0"/>
+              <a:t>Skews real distribution of good/bad loans</a:t>
             </a:r>
           </a:p>
           <a:p>
             <a:pPr lvl="1"/>
             <a:r>
-              <a:rPr lang="en-US" sz="1200" dirty="0"/>
-              <a:t>Customer Specific Information</a:t>
+              <a:rPr lang="en-US" dirty="0"/>
+              <a:t>Imperfect merge of provided data</a:t>
             </a:r>
           </a:p>
           <a:p>
             <a:pPr lvl="2"/>
             <a:r>
-              <a:rPr lang="en-US" sz="1200" i="1" dirty="0"/>
-              <a:t>General</a:t>
-            </a:r>
-            <a:r>
-              <a:rPr lang="en-US" sz="1200" dirty="0"/>
-              <a:t>: Birth date, owns or rents residence, address zip code, email, etc.</a:t>
+              <a:rPr lang="en-US" dirty="0" err="1"/>
+              <a:t>CustomerId</a:t>
+            </a:r>
+            <a:r>
+              <a:rPr lang="en-US" dirty="0"/>
+              <a:t> not unique in loan indicator data</a:t>
             </a:r>
           </a:p>
           <a:p>
             <a:pPr lvl="2"/>
             <a:r>
-              <a:rPr lang="en-US" sz="1200" i="1" dirty="0"/>
-              <a:t>Duration/Frequency</a:t>
-            </a:r>
-            <a:r>
-              <a:rPr lang="en-US" sz="1200" dirty="0"/>
-              <a:t>: Residence duration, bank account duration, etc.</a:t>
-            </a:r>
-          </a:p>
-          <a:p>
-            <a:pPr lvl="2"/>
-            <a:r>
-              <a:rPr lang="en-US" sz="1200" i="1" dirty="0"/>
-              <a:t>Credit History</a:t>
-            </a:r>
-            <a:r>
-              <a:rPr lang="en-US" sz="1200" dirty="0"/>
-              <a:t>: Link2Credit score, FICO scores</a:t>
+              <a:rPr lang="en-US" dirty="0"/>
+              <a:t>3 instances where same customer had at least one bad loan and at least one good loan</a:t>
             </a:r>
           </a:p>
           <a:p>
             <a:pPr lvl="1"/>
             <a:r>
-              <a:rPr lang="en-US" sz="1200" dirty="0"/>
-              <a:t>Loan Specific Information:</a:t>
-            </a:r>
-          </a:p>
-          <a:p>
-            <a:pPr lvl="2"/>
-            <a:r>
-              <a:rPr lang="en-US" sz="1200" dirty="0"/>
-              <a:t>Amount requested, payment frequency, loan duration, application submit date, etc.</a:t>
-            </a:r>
-          </a:p>
-          <a:p>
-            <a:r>
-              <a:rPr lang="en-US" sz="1400" b="1" i="1" dirty="0"/>
-              <a:t>Notes/Limitations</a:t>
-            </a:r>
-            <a:r>
-              <a:rPr lang="en-US" sz="1400" dirty="0"/>
-              <a:t>:</a:t>
-            </a:r>
-          </a:p>
-          <a:p>
-            <a:pPr lvl="1"/>
-            <a:r>
-              <a:rPr lang="en-US" sz="1200" i="0" dirty="0">
+              <a:rPr lang="en-US" i="0" dirty="0">
                 <a:effectLst/>
                 <a:latin typeface="-apple-system"/>
               </a:rPr>
               <a:t>Small sample size</a:t>
             </a:r>
-            <a:endParaRPr lang="en-US" sz="1200" dirty="0"/>
+            <a:endParaRPr lang="en-US" dirty="0"/>
           </a:p>
           <a:p>
             <a:pPr lvl="1"/>
             <a:r>
-              <a:rPr lang="en-US" sz="1200" dirty="0"/>
+              <a:rPr lang="en-US" dirty="0"/>
               <a:t>No data dictionary provided</a:t>
             </a:r>
           </a:p>
           <a:p>
             <a:pPr lvl="1"/>
             <a:r>
-              <a:rPr lang="en-US" sz="1200" dirty="0"/>
+              <a:rPr lang="en-US" dirty="0"/>
               <a:t>No macro-economic factors</a:t>
             </a:r>
           </a:p>
           <a:p>
             <a:pPr lvl="1"/>
             <a:r>
-              <a:rPr lang="en-US" sz="1200" dirty="0"/>
+              <a:rPr lang="en-US" dirty="0"/>
               <a:t>One loan application per customer (no repeat customers)</a:t>
             </a:r>
           </a:p>
           <a:p>
             <a:pPr lvl="2"/>
             <a:r>
-              <a:rPr lang="en-US" sz="1200" dirty="0"/>
+              <a:rPr lang="en-US" dirty="0"/>
               <a:t>Intended since goal is to identify if a new applicant should be given a loan</a:t>
             </a:r>
-          </a:p>
-          <a:p>
-            <a:pPr lvl="1"/>
-            <a:endParaRPr lang="en-US" sz="900" dirty="0"/>
           </a:p>
         </p:txBody>
       </p:sp>
@@ -5954,12 +7118,14 @@
           </a:xfrm>
         </p:spPr>
         <p:txBody>
-          <a:bodyPr/>
+          <a:bodyPr>
+            <a:normAutofit/>
+          </a:bodyPr>
           <a:lstStyle/>
           <a:p>
             <a:pPr algn="ctr"/>
             <a:r>
-              <a:rPr lang="en-US" b="1" dirty="0">
+              <a:rPr lang="en-US" sz="3200" b="1" dirty="0">
                 <a:latin typeface="Calibri" panose="020F0502020204030204" pitchFamily="34" charset="0"/>
                 <a:cs typeface="Calibri" panose="020F0502020204030204" pitchFamily="34" charset="0"/>
               </a:rPr>
@@ -5970,87 +7136,293 @@
       </p:sp>
       <p:sp>
         <p:nvSpPr>
-          <p:cNvPr id="3" name="Content Placeholder 2">
+          <p:cNvPr id="4" name="Content Placeholder 2">
             <a:extLst>
               <a:ext uri="{FF2B5EF4-FFF2-40B4-BE49-F238E27FC236}">
-                <a16:creationId xmlns:a16="http://schemas.microsoft.com/office/drawing/2014/main" id="{B7EE14D3-F914-15D7-E988-B5EFBD0001CF}"/>
+                <a16:creationId xmlns:a16="http://schemas.microsoft.com/office/drawing/2014/main" id="{136DE10C-D8FA-51B0-B102-8BAF50D524AF}"/>
               </a:ext>
             </a:extLst>
           </p:cNvPr>
-          <p:cNvSpPr>
-            <a:spLocks noGrp="1"/>
-          </p:cNvSpPr>
-          <p:nvPr>
-            <p:ph idx="1"/>
-          </p:nvPr>
+          <p:cNvSpPr txBox="1">
+            <a:spLocks/>
+          </p:cNvSpPr>
+          <p:nvPr/>
         </p:nvSpPr>
         <p:spPr>
           <a:xfrm>
-            <a:off x="2231136" y="1878008"/>
-            <a:ext cx="7729728" cy="3101983"/>
+            <a:off x="1286314" y="1966152"/>
+            <a:ext cx="4569203" cy="1737551"/>
           </a:xfrm>
+          <a:prstGeom prst="rect">
+            <a:avLst/>
+          </a:prstGeom>
         </p:spPr>
         <p:txBody>
-          <a:bodyPr>
+          <a:bodyPr vert="horz" lIns="91440" tIns="45720" rIns="91440" bIns="45720" rtlCol="0">
             <a:normAutofit fontScale="25000" lnSpcReduction="20000"/>
           </a:bodyPr>
-          <a:lstStyle/>
-          <a:p>
-            <a:r>
-              <a:rPr lang="en-US" sz="5600" b="1" i="1" dirty="0"/>
+          <a:lstStyle>
+            <a:lvl1pPr marL="228600" indent="-228600" algn="l" defTabSz="914400" rtl="0" eaLnBrk="1" latinLnBrk="0" hangingPunct="1">
+              <a:lnSpc>
+                <a:spcPct val="100000"/>
+              </a:lnSpc>
+              <a:spcBef>
+                <a:spcPts val="1000"/>
+              </a:spcBef>
+              <a:buClr>
+                <a:schemeClr val="accent2"/>
+              </a:buClr>
+              <a:buFont typeface="Arial" panose="020B0604020202020204" pitchFamily="34" charset="0"/>
+              <a:buChar char="•"/>
+              <a:defRPr sz="1800" kern="1200">
+                <a:solidFill>
+                  <a:schemeClr val="tx1">
+                    <a:lumMod val="85000"/>
+                    <a:lumOff val="15000"/>
+                  </a:schemeClr>
+                </a:solidFill>
+                <a:latin typeface="+mn-lt"/>
+                <a:ea typeface="+mn-ea"/>
+                <a:cs typeface="+mn-cs"/>
+              </a:defRPr>
+            </a:lvl1pPr>
+            <a:lvl2pPr marL="457200" indent="-228600" algn="l" defTabSz="914400" rtl="0" eaLnBrk="1" latinLnBrk="0" hangingPunct="1">
+              <a:lnSpc>
+                <a:spcPct val="100000"/>
+              </a:lnSpc>
+              <a:spcBef>
+                <a:spcPts val="1000"/>
+              </a:spcBef>
+              <a:buClr>
+                <a:schemeClr val="accent2"/>
+              </a:buClr>
+              <a:buFont typeface="Arial" panose="020B0604020202020204" pitchFamily="34" charset="0"/>
+              <a:buChar char="•"/>
+              <a:defRPr sz="1600" kern="1200">
+                <a:solidFill>
+                  <a:schemeClr val="tx1">
+                    <a:lumMod val="85000"/>
+                    <a:lumOff val="15000"/>
+                  </a:schemeClr>
+                </a:solidFill>
+                <a:latin typeface="+mn-lt"/>
+                <a:ea typeface="+mn-ea"/>
+                <a:cs typeface="+mn-cs"/>
+              </a:defRPr>
+            </a:lvl2pPr>
+            <a:lvl3pPr marL="685800" indent="-228600" algn="l" defTabSz="914400" rtl="0" eaLnBrk="1" latinLnBrk="0" hangingPunct="1">
+              <a:lnSpc>
+                <a:spcPct val="100000"/>
+              </a:lnSpc>
+              <a:spcBef>
+                <a:spcPts val="1000"/>
+              </a:spcBef>
+              <a:buClr>
+                <a:schemeClr val="accent2"/>
+              </a:buClr>
+              <a:buFont typeface="Arial" panose="020B0604020202020204" pitchFamily="34" charset="0"/>
+              <a:buChar char="•"/>
+              <a:defRPr sz="1600" kern="1200">
+                <a:solidFill>
+                  <a:schemeClr val="tx1">
+                    <a:lumMod val="85000"/>
+                    <a:lumOff val="15000"/>
+                  </a:schemeClr>
+                </a:solidFill>
+                <a:latin typeface="+mn-lt"/>
+                <a:ea typeface="+mn-ea"/>
+                <a:cs typeface="+mn-cs"/>
+              </a:defRPr>
+            </a:lvl3pPr>
+            <a:lvl4pPr marL="914400" indent="-228600" algn="l" defTabSz="914400" rtl="0" eaLnBrk="1" latinLnBrk="0" hangingPunct="1">
+              <a:lnSpc>
+                <a:spcPct val="100000"/>
+              </a:lnSpc>
+              <a:spcBef>
+                <a:spcPts val="1000"/>
+              </a:spcBef>
+              <a:buClr>
+                <a:schemeClr val="accent2"/>
+              </a:buClr>
+              <a:buFont typeface="Arial" panose="020B0604020202020204" pitchFamily="34" charset="0"/>
+              <a:buChar char="•"/>
+              <a:defRPr sz="1600" kern="1200">
+                <a:solidFill>
+                  <a:schemeClr val="tx1">
+                    <a:lumMod val="85000"/>
+                    <a:lumOff val="15000"/>
+                  </a:schemeClr>
+                </a:solidFill>
+                <a:latin typeface="+mn-lt"/>
+                <a:ea typeface="+mn-ea"/>
+                <a:cs typeface="+mn-cs"/>
+              </a:defRPr>
+            </a:lvl4pPr>
+            <a:lvl5pPr marL="1143000" indent="-228600" algn="l" defTabSz="914400" rtl="0" eaLnBrk="1" latinLnBrk="0" hangingPunct="1">
+              <a:lnSpc>
+                <a:spcPct val="100000"/>
+              </a:lnSpc>
+              <a:spcBef>
+                <a:spcPts val="1000"/>
+              </a:spcBef>
+              <a:buClr>
+                <a:schemeClr val="accent2"/>
+              </a:buClr>
+              <a:buFont typeface="Arial" panose="020B0604020202020204" pitchFamily="34" charset="0"/>
+              <a:buChar char="•"/>
+              <a:defRPr sz="1600" kern="1200">
+                <a:solidFill>
+                  <a:schemeClr val="tx1">
+                    <a:lumMod val="85000"/>
+                    <a:lumOff val="15000"/>
+                  </a:schemeClr>
+                </a:solidFill>
+                <a:latin typeface="+mn-lt"/>
+                <a:ea typeface="+mn-ea"/>
+                <a:cs typeface="+mn-cs"/>
+              </a:defRPr>
+            </a:lvl5pPr>
+            <a:lvl6pPr marL="1312863" indent="-228600" algn="l" defTabSz="914400" rtl="0" eaLnBrk="1" latinLnBrk="0" hangingPunct="1">
+              <a:lnSpc>
+                <a:spcPct val="100000"/>
+              </a:lnSpc>
+              <a:spcBef>
+                <a:spcPts val="1000"/>
+              </a:spcBef>
+              <a:buClr>
+                <a:schemeClr val="accent2"/>
+              </a:buClr>
+              <a:buFont typeface="Arial" panose="020B0604020202020204" pitchFamily="34" charset="0"/>
+              <a:buChar char="•"/>
+              <a:defRPr sz="1600" kern="1200">
+                <a:solidFill>
+                  <a:schemeClr val="tx1"/>
+                </a:solidFill>
+                <a:latin typeface="+mn-lt"/>
+                <a:ea typeface="+mn-ea"/>
+                <a:cs typeface="+mn-cs"/>
+              </a:defRPr>
+            </a:lvl6pPr>
+            <a:lvl7pPr marL="1484313" indent="-228600" algn="l" defTabSz="914400" rtl="0" eaLnBrk="1" latinLnBrk="0" hangingPunct="1">
+              <a:lnSpc>
+                <a:spcPct val="100000"/>
+              </a:lnSpc>
+              <a:spcBef>
+                <a:spcPts val="1000"/>
+              </a:spcBef>
+              <a:buClr>
+                <a:schemeClr val="accent2"/>
+              </a:buClr>
+              <a:buFont typeface="Arial" panose="020B0604020202020204" pitchFamily="34" charset="0"/>
+              <a:buChar char="•"/>
+              <a:defRPr sz="1600" kern="1200">
+                <a:solidFill>
+                  <a:schemeClr val="tx1"/>
+                </a:solidFill>
+                <a:latin typeface="+mn-lt"/>
+                <a:ea typeface="+mn-ea"/>
+                <a:cs typeface="+mn-cs"/>
+              </a:defRPr>
+            </a:lvl7pPr>
+            <a:lvl8pPr marL="1657350" indent="-228600" algn="l" defTabSz="914400" rtl="0" eaLnBrk="1" latinLnBrk="0" hangingPunct="1">
+              <a:lnSpc>
+                <a:spcPct val="100000"/>
+              </a:lnSpc>
+              <a:spcBef>
+                <a:spcPts val="1000"/>
+              </a:spcBef>
+              <a:buClr>
+                <a:schemeClr val="accent2"/>
+              </a:buClr>
+              <a:buFont typeface="Arial" panose="020B0604020202020204" pitchFamily="34" charset="0"/>
+              <a:buChar char="•"/>
+              <a:defRPr sz="1600" kern="1200" baseline="0">
+                <a:solidFill>
+                  <a:schemeClr val="tx1"/>
+                </a:solidFill>
+                <a:latin typeface="+mn-lt"/>
+                <a:ea typeface="+mn-ea"/>
+                <a:cs typeface="+mn-cs"/>
+              </a:defRPr>
+            </a:lvl8pPr>
+            <a:lvl9pPr marL="1882775" indent="-228600" algn="l" defTabSz="914400" rtl="0" eaLnBrk="1" latinLnBrk="0" hangingPunct="1">
+              <a:lnSpc>
+                <a:spcPct val="100000"/>
+              </a:lnSpc>
+              <a:spcBef>
+                <a:spcPts val="1000"/>
+              </a:spcBef>
+              <a:buClr>
+                <a:schemeClr val="accent2"/>
+              </a:buClr>
+              <a:buFont typeface="Arial" panose="020B0604020202020204" pitchFamily="34" charset="0"/>
+              <a:buChar char="•"/>
+              <a:defRPr sz="1600" kern="1200" baseline="0">
+                <a:solidFill>
+                  <a:schemeClr val="tx1"/>
+                </a:solidFill>
+                <a:latin typeface="+mn-lt"/>
+                <a:ea typeface="+mn-ea"/>
+                <a:cs typeface="+mn-cs"/>
+              </a:defRPr>
+            </a:lvl9pPr>
+          </a:lstStyle>
+          <a:p>
+            <a:r>
+              <a:rPr lang="en-US" sz="7200" b="1" i="1" dirty="0"/>
               <a:t>Handling Null Values</a:t>
             </a:r>
           </a:p>
           <a:p>
             <a:pPr lvl="1"/>
             <a:r>
-              <a:rPr lang="en-US" sz="4800" i="1" dirty="0" err="1"/>
+              <a:rPr lang="en-US" sz="6400" i="1" dirty="0" err="1"/>
               <a:t>other_phone_type</a:t>
             </a:r>
             <a:r>
-              <a:rPr lang="en-US" sz="4800" dirty="0"/>
+              <a:rPr lang="en-US" sz="6400" dirty="0"/>
               <a:t>: 291 nulls </a:t>
             </a:r>
             <a:r>
-              <a:rPr lang="en-US" sz="4800" dirty="0">
+              <a:rPr lang="en-US" sz="6400" dirty="0">
                 <a:sym typeface="Wingdings" pitchFamily="2" charset="2"/>
               </a:rPr>
               <a:t></a:t>
             </a:r>
             <a:r>
-              <a:rPr lang="en-US" sz="4800" dirty="0"/>
+              <a:rPr lang="en-US" sz="6400" dirty="0"/>
               <a:t>  drop feature</a:t>
             </a:r>
           </a:p>
           <a:p>
             <a:pPr lvl="1"/>
             <a:r>
-              <a:rPr lang="en-US" sz="4800" i="1" dirty="0" err="1"/>
+              <a:rPr lang="en-US" sz="6400" i="1" dirty="0" err="1"/>
               <a:t>payment_amount_approved</a:t>
             </a:r>
             <a:r>
-              <a:rPr lang="en-US" sz="4800" dirty="0"/>
+              <a:rPr lang="en-US" sz="6400" dirty="0"/>
               <a:t>: 22 nulls </a:t>
             </a:r>
             <a:r>
-              <a:rPr lang="en-US" sz="4800" dirty="0">
+              <a:rPr lang="en-US" sz="6400" dirty="0">
                 <a:sym typeface="Wingdings" pitchFamily="2" charset="2"/>
               </a:rPr>
-              <a:t> data imputation</a:t>
+              <a:t> drop feature (not present in production data)</a:t>
             </a:r>
           </a:p>
           <a:p>
             <a:pPr lvl="1"/>
             <a:r>
-              <a:rPr lang="en-US" sz="4800" i="1" dirty="0" err="1"/>
+              <a:rPr lang="en-US" sz="6400" i="1" dirty="0" err="1"/>
               <a:t>how_use_money</a:t>
             </a:r>
             <a:r>
-              <a:rPr lang="en-US" sz="4800" dirty="0"/>
+              <a:rPr lang="en-US" sz="6400" dirty="0"/>
               <a:t>: 2 nulls </a:t>
             </a:r>
             <a:r>
-              <a:rPr lang="en-US" sz="4800" dirty="0">
+              <a:rPr lang="en-US" sz="6400" dirty="0">
                 <a:sym typeface="Wingdings" pitchFamily="2" charset="2"/>
               </a:rPr>
               <a:t> drop null rows</a:t>
@@ -6059,15 +7431,15 @@
           <a:p>
             <a:pPr lvl="1"/>
             <a:r>
-              <a:rPr lang="en-US" sz="4800" i="1" dirty="0" err="1"/>
+              <a:rPr lang="en-US" sz="6400" i="1" dirty="0" err="1"/>
               <a:t>bank_account_duration</a:t>
             </a:r>
             <a:r>
-              <a:rPr lang="en-US" sz="4800" dirty="0"/>
+              <a:rPr lang="en-US" sz="6400" dirty="0"/>
               <a:t>: 1 null </a:t>
             </a:r>
             <a:r>
-              <a:rPr lang="en-US" sz="4800" dirty="0">
+              <a:rPr lang="en-US" sz="6400" dirty="0">
                 <a:sym typeface="Wingdings" pitchFamily="2" charset="2"/>
               </a:rPr>
               <a:t> drop null row</a:t>
@@ -6075,17 +7447,262 @@
           </a:p>
           <a:p>
             <a:pPr lvl="1"/>
-            <a:endParaRPr lang="en-US" sz="4800" dirty="0">
+            <a:endParaRPr lang="en-US" sz="5600" dirty="0">
               <a:sym typeface="Wingdings" pitchFamily="2" charset="2"/>
             </a:endParaRPr>
           </a:p>
           <a:p>
-            <a:r>
-              <a:rPr lang="en-US" sz="5600" b="1" i="1" dirty="0"/>
+            <a:pPr lvl="1"/>
+            <a:endParaRPr lang="en-US" sz="2000" dirty="0">
+              <a:sym typeface="Wingdings" pitchFamily="2" charset="2"/>
+            </a:endParaRPr>
+          </a:p>
+          <a:p>
+            <a:pPr lvl="1"/>
+            <a:endParaRPr lang="en-US" dirty="0"/>
+          </a:p>
+        </p:txBody>
+      </p:sp>
+      <p:sp>
+        <p:nvSpPr>
+          <p:cNvPr id="5" name="Content Placeholder 2">
+            <a:extLst>
+              <a:ext uri="{FF2B5EF4-FFF2-40B4-BE49-F238E27FC236}">
+                <a16:creationId xmlns:a16="http://schemas.microsoft.com/office/drawing/2014/main" id="{9A2C8916-CF22-CB47-ED63-678129B83214}"/>
+              </a:ext>
+            </a:extLst>
+          </p:cNvPr>
+          <p:cNvSpPr txBox="1">
+            <a:spLocks/>
+          </p:cNvSpPr>
+          <p:nvPr/>
+        </p:nvSpPr>
+        <p:spPr>
+          <a:xfrm>
+            <a:off x="1286314" y="4044950"/>
+            <a:ext cx="4569203" cy="1737551"/>
+          </a:xfrm>
+          <a:prstGeom prst="rect">
+            <a:avLst/>
+          </a:prstGeom>
+        </p:spPr>
+        <p:txBody>
+          <a:bodyPr vert="horz" lIns="91440" tIns="45720" rIns="91440" bIns="45720" rtlCol="0">
+            <a:normAutofit/>
+          </a:bodyPr>
+          <a:lstStyle>
+            <a:lvl1pPr marL="228600" indent="-228600" algn="l" defTabSz="914400" rtl="0" eaLnBrk="1" latinLnBrk="0" hangingPunct="1">
+              <a:lnSpc>
+                <a:spcPct val="100000"/>
+              </a:lnSpc>
+              <a:spcBef>
+                <a:spcPts val="1000"/>
+              </a:spcBef>
+              <a:buClr>
+                <a:schemeClr val="accent2"/>
+              </a:buClr>
+              <a:buFont typeface="Arial" panose="020B0604020202020204" pitchFamily="34" charset="0"/>
+              <a:buChar char="•"/>
+              <a:defRPr sz="1800" kern="1200">
+                <a:solidFill>
+                  <a:schemeClr val="tx1">
+                    <a:lumMod val="85000"/>
+                    <a:lumOff val="15000"/>
+                  </a:schemeClr>
+                </a:solidFill>
+                <a:latin typeface="+mn-lt"/>
+                <a:ea typeface="+mn-ea"/>
+                <a:cs typeface="+mn-cs"/>
+              </a:defRPr>
+            </a:lvl1pPr>
+            <a:lvl2pPr marL="457200" indent="-228600" algn="l" defTabSz="914400" rtl="0" eaLnBrk="1" latinLnBrk="0" hangingPunct="1">
+              <a:lnSpc>
+                <a:spcPct val="100000"/>
+              </a:lnSpc>
+              <a:spcBef>
+                <a:spcPts val="1000"/>
+              </a:spcBef>
+              <a:buClr>
+                <a:schemeClr val="accent2"/>
+              </a:buClr>
+              <a:buFont typeface="Arial" panose="020B0604020202020204" pitchFamily="34" charset="0"/>
+              <a:buChar char="•"/>
+              <a:defRPr sz="1600" kern="1200">
+                <a:solidFill>
+                  <a:schemeClr val="tx1">
+                    <a:lumMod val="85000"/>
+                    <a:lumOff val="15000"/>
+                  </a:schemeClr>
+                </a:solidFill>
+                <a:latin typeface="+mn-lt"/>
+                <a:ea typeface="+mn-ea"/>
+                <a:cs typeface="+mn-cs"/>
+              </a:defRPr>
+            </a:lvl2pPr>
+            <a:lvl3pPr marL="685800" indent="-228600" algn="l" defTabSz="914400" rtl="0" eaLnBrk="1" latinLnBrk="0" hangingPunct="1">
+              <a:lnSpc>
+                <a:spcPct val="100000"/>
+              </a:lnSpc>
+              <a:spcBef>
+                <a:spcPts val="1000"/>
+              </a:spcBef>
+              <a:buClr>
+                <a:schemeClr val="accent2"/>
+              </a:buClr>
+              <a:buFont typeface="Arial" panose="020B0604020202020204" pitchFamily="34" charset="0"/>
+              <a:buChar char="•"/>
+              <a:defRPr sz="1600" kern="1200">
+                <a:solidFill>
+                  <a:schemeClr val="tx1">
+                    <a:lumMod val="85000"/>
+                    <a:lumOff val="15000"/>
+                  </a:schemeClr>
+                </a:solidFill>
+                <a:latin typeface="+mn-lt"/>
+                <a:ea typeface="+mn-ea"/>
+                <a:cs typeface="+mn-cs"/>
+              </a:defRPr>
+            </a:lvl3pPr>
+            <a:lvl4pPr marL="914400" indent="-228600" algn="l" defTabSz="914400" rtl="0" eaLnBrk="1" latinLnBrk="0" hangingPunct="1">
+              <a:lnSpc>
+                <a:spcPct val="100000"/>
+              </a:lnSpc>
+              <a:spcBef>
+                <a:spcPts val="1000"/>
+              </a:spcBef>
+              <a:buClr>
+                <a:schemeClr val="accent2"/>
+              </a:buClr>
+              <a:buFont typeface="Arial" panose="020B0604020202020204" pitchFamily="34" charset="0"/>
+              <a:buChar char="•"/>
+              <a:defRPr sz="1600" kern="1200">
+                <a:solidFill>
+                  <a:schemeClr val="tx1">
+                    <a:lumMod val="85000"/>
+                    <a:lumOff val="15000"/>
+                  </a:schemeClr>
+                </a:solidFill>
+                <a:latin typeface="+mn-lt"/>
+                <a:ea typeface="+mn-ea"/>
+                <a:cs typeface="+mn-cs"/>
+              </a:defRPr>
+            </a:lvl4pPr>
+            <a:lvl5pPr marL="1143000" indent="-228600" algn="l" defTabSz="914400" rtl="0" eaLnBrk="1" latinLnBrk="0" hangingPunct="1">
+              <a:lnSpc>
+                <a:spcPct val="100000"/>
+              </a:lnSpc>
+              <a:spcBef>
+                <a:spcPts val="1000"/>
+              </a:spcBef>
+              <a:buClr>
+                <a:schemeClr val="accent2"/>
+              </a:buClr>
+              <a:buFont typeface="Arial" panose="020B0604020202020204" pitchFamily="34" charset="0"/>
+              <a:buChar char="•"/>
+              <a:defRPr sz="1600" kern="1200">
+                <a:solidFill>
+                  <a:schemeClr val="tx1">
+                    <a:lumMod val="85000"/>
+                    <a:lumOff val="15000"/>
+                  </a:schemeClr>
+                </a:solidFill>
+                <a:latin typeface="+mn-lt"/>
+                <a:ea typeface="+mn-ea"/>
+                <a:cs typeface="+mn-cs"/>
+              </a:defRPr>
+            </a:lvl5pPr>
+            <a:lvl6pPr marL="1312863" indent="-228600" algn="l" defTabSz="914400" rtl="0" eaLnBrk="1" latinLnBrk="0" hangingPunct="1">
+              <a:lnSpc>
+                <a:spcPct val="100000"/>
+              </a:lnSpc>
+              <a:spcBef>
+                <a:spcPts val="1000"/>
+              </a:spcBef>
+              <a:buClr>
+                <a:schemeClr val="accent2"/>
+              </a:buClr>
+              <a:buFont typeface="Arial" panose="020B0604020202020204" pitchFamily="34" charset="0"/>
+              <a:buChar char="•"/>
+              <a:defRPr sz="1600" kern="1200">
+                <a:solidFill>
+                  <a:schemeClr val="tx1"/>
+                </a:solidFill>
+                <a:latin typeface="+mn-lt"/>
+                <a:ea typeface="+mn-ea"/>
+                <a:cs typeface="+mn-cs"/>
+              </a:defRPr>
+            </a:lvl6pPr>
+            <a:lvl7pPr marL="1484313" indent="-228600" algn="l" defTabSz="914400" rtl="0" eaLnBrk="1" latinLnBrk="0" hangingPunct="1">
+              <a:lnSpc>
+                <a:spcPct val="100000"/>
+              </a:lnSpc>
+              <a:spcBef>
+                <a:spcPts val="1000"/>
+              </a:spcBef>
+              <a:buClr>
+                <a:schemeClr val="accent2"/>
+              </a:buClr>
+              <a:buFont typeface="Arial" panose="020B0604020202020204" pitchFamily="34" charset="0"/>
+              <a:buChar char="•"/>
+              <a:defRPr sz="1600" kern="1200">
+                <a:solidFill>
+                  <a:schemeClr val="tx1"/>
+                </a:solidFill>
+                <a:latin typeface="+mn-lt"/>
+                <a:ea typeface="+mn-ea"/>
+                <a:cs typeface="+mn-cs"/>
+              </a:defRPr>
+            </a:lvl7pPr>
+            <a:lvl8pPr marL="1657350" indent="-228600" algn="l" defTabSz="914400" rtl="0" eaLnBrk="1" latinLnBrk="0" hangingPunct="1">
+              <a:lnSpc>
+                <a:spcPct val="100000"/>
+              </a:lnSpc>
+              <a:spcBef>
+                <a:spcPts val="1000"/>
+              </a:spcBef>
+              <a:buClr>
+                <a:schemeClr val="accent2"/>
+              </a:buClr>
+              <a:buFont typeface="Arial" panose="020B0604020202020204" pitchFamily="34" charset="0"/>
+              <a:buChar char="•"/>
+              <a:defRPr sz="1600" kern="1200" baseline="0">
+                <a:solidFill>
+                  <a:schemeClr val="tx1"/>
+                </a:solidFill>
+                <a:latin typeface="+mn-lt"/>
+                <a:ea typeface="+mn-ea"/>
+                <a:cs typeface="+mn-cs"/>
+              </a:defRPr>
+            </a:lvl8pPr>
+            <a:lvl9pPr marL="1882775" indent="-228600" algn="l" defTabSz="914400" rtl="0" eaLnBrk="1" latinLnBrk="0" hangingPunct="1">
+              <a:lnSpc>
+                <a:spcPct val="100000"/>
+              </a:lnSpc>
+              <a:spcBef>
+                <a:spcPts val="1000"/>
+              </a:spcBef>
+              <a:buClr>
+                <a:schemeClr val="accent2"/>
+              </a:buClr>
+              <a:buFont typeface="Arial" panose="020B0604020202020204" pitchFamily="34" charset="0"/>
+              <a:buChar char="•"/>
+              <a:defRPr sz="1600" kern="1200" baseline="0">
+                <a:solidFill>
+                  <a:schemeClr val="tx1"/>
+                </a:solidFill>
+                <a:latin typeface="+mn-lt"/>
+                <a:ea typeface="+mn-ea"/>
+                <a:cs typeface="+mn-cs"/>
+              </a:defRPr>
+            </a:lvl9pPr>
+          </a:lstStyle>
+          <a:p>
+            <a:r>
+              <a:rPr lang="en-US" b="1" i="1" dirty="0"/>
               <a:t>Handling </a:t>
             </a:r>
             <a:r>
-              <a:rPr lang="en-US" sz="5600" b="1" i="1" dirty="0">
+              <a:rPr lang="en-US" b="1" i="1" dirty="0">
                 <a:sym typeface="Wingdings" pitchFamily="2" charset="2"/>
               </a:rPr>
               <a:t>Boolean Values</a:t>
@@ -6094,53 +7711,284 @@
           <a:p>
             <a:pPr lvl="1"/>
             <a:r>
-              <a:rPr lang="en-US" sz="4800" dirty="0">
+              <a:rPr lang="en-US" dirty="0">
                 <a:sym typeface="Wingdings" pitchFamily="2" charset="2"/>
               </a:rPr>
-              <a:t>Encode T/F, Y/N  as 1/0</a:t>
+              <a:t>Encode T/F,  Y/N, Good/Bad as 1/0</a:t>
             </a:r>
           </a:p>
           <a:p>
             <a:pPr lvl="1"/>
             <a:r>
-              <a:rPr lang="en-US" sz="4800" dirty="0">
+              <a:rPr lang="en-US" dirty="0">
                 <a:sym typeface="Wingdings" pitchFamily="2" charset="2"/>
               </a:rPr>
               <a:t>Features: </a:t>
             </a:r>
             <a:r>
-              <a:rPr lang="en-US" sz="4800" i="1" dirty="0" err="1"/>
+              <a:rPr lang="en-US" i="1" dirty="0" err="1"/>
               <a:t>residence_rent_or_own</a:t>
             </a:r>
             <a:r>
-              <a:rPr lang="en-US" sz="4800" dirty="0"/>
+              <a:rPr lang="en-US" dirty="0"/>
               <a:t>, </a:t>
             </a:r>
             <a:r>
-              <a:rPr lang="en-US" sz="4800" i="1" dirty="0" err="1"/>
+              <a:rPr lang="en-US" i="1" dirty="0" err="1"/>
               <a:t>bank_account_direct_deposit</a:t>
             </a:r>
             <a:r>
-              <a:rPr lang="en-US" sz="4800" dirty="0"/>
+              <a:rPr lang="en-US" dirty="0"/>
               <a:t>, </a:t>
             </a:r>
             <a:r>
-              <a:rPr lang="en-US" sz="4800" i="1" dirty="0" err="1"/>
+              <a:rPr lang="en-US" i="1" dirty="0" err="1"/>
               <a:t>payment_ach</a:t>
             </a:r>
-            <a:endParaRPr lang="en-US" sz="4800" i="1" dirty="0"/>
-          </a:p>
-          <a:p>
-            <a:pPr marL="457200" lvl="1" indent="0">
-              <a:buNone/>
-            </a:pPr>
-            <a:endParaRPr lang="en-US" sz="4800" dirty="0">
-              <a:sym typeface="Wingdings" pitchFamily="2" charset="2"/>
-            </a:endParaRPr>
-          </a:p>
-          <a:p>
-            <a:r>
-              <a:rPr lang="en-US" sz="5600" b="1" dirty="0">
+            <a:endParaRPr lang="en-US" i="1" dirty="0"/>
+          </a:p>
+          <a:p>
+            <a:pPr lvl="1"/>
+            <a:endParaRPr lang="en-US" dirty="0"/>
+          </a:p>
+        </p:txBody>
+      </p:sp>
+      <p:sp>
+        <p:nvSpPr>
+          <p:cNvPr id="7" name="Content Placeholder 2">
+            <a:extLst>
+              <a:ext uri="{FF2B5EF4-FFF2-40B4-BE49-F238E27FC236}">
+                <a16:creationId xmlns:a16="http://schemas.microsoft.com/office/drawing/2014/main" id="{F174F3A1-B40E-F103-6ED9-62CC2EA9ABCF}"/>
+              </a:ext>
+            </a:extLst>
+          </p:cNvPr>
+          <p:cNvSpPr txBox="1">
+            <a:spLocks/>
+          </p:cNvSpPr>
+          <p:nvPr/>
+        </p:nvSpPr>
+        <p:spPr>
+          <a:xfrm>
+            <a:off x="6157519" y="1966152"/>
+            <a:ext cx="4569203" cy="1737551"/>
+          </a:xfrm>
+          <a:prstGeom prst="rect">
+            <a:avLst/>
+          </a:prstGeom>
+        </p:spPr>
+        <p:txBody>
+          <a:bodyPr vert="horz" lIns="91440" tIns="45720" rIns="91440" bIns="45720" rtlCol="0">
+            <a:normAutofit/>
+          </a:bodyPr>
+          <a:lstStyle>
+            <a:lvl1pPr marL="228600" indent="-228600" algn="l" defTabSz="914400" rtl="0" eaLnBrk="1" latinLnBrk="0" hangingPunct="1">
+              <a:lnSpc>
+                <a:spcPct val="100000"/>
+              </a:lnSpc>
+              <a:spcBef>
+                <a:spcPts val="1000"/>
+              </a:spcBef>
+              <a:buClr>
+                <a:schemeClr val="accent2"/>
+              </a:buClr>
+              <a:buFont typeface="Arial" panose="020B0604020202020204" pitchFamily="34" charset="0"/>
+              <a:buChar char="•"/>
+              <a:defRPr sz="1800" kern="1200">
+                <a:solidFill>
+                  <a:schemeClr val="tx1">
+                    <a:lumMod val="85000"/>
+                    <a:lumOff val="15000"/>
+                  </a:schemeClr>
+                </a:solidFill>
+                <a:latin typeface="+mn-lt"/>
+                <a:ea typeface="+mn-ea"/>
+                <a:cs typeface="+mn-cs"/>
+              </a:defRPr>
+            </a:lvl1pPr>
+            <a:lvl2pPr marL="457200" indent="-228600" algn="l" defTabSz="914400" rtl="0" eaLnBrk="1" latinLnBrk="0" hangingPunct="1">
+              <a:lnSpc>
+                <a:spcPct val="100000"/>
+              </a:lnSpc>
+              <a:spcBef>
+                <a:spcPts val="1000"/>
+              </a:spcBef>
+              <a:buClr>
+                <a:schemeClr val="accent2"/>
+              </a:buClr>
+              <a:buFont typeface="Arial" panose="020B0604020202020204" pitchFamily="34" charset="0"/>
+              <a:buChar char="•"/>
+              <a:defRPr sz="1600" kern="1200">
+                <a:solidFill>
+                  <a:schemeClr val="tx1">
+                    <a:lumMod val="85000"/>
+                    <a:lumOff val="15000"/>
+                  </a:schemeClr>
+                </a:solidFill>
+                <a:latin typeface="+mn-lt"/>
+                <a:ea typeface="+mn-ea"/>
+                <a:cs typeface="+mn-cs"/>
+              </a:defRPr>
+            </a:lvl2pPr>
+            <a:lvl3pPr marL="685800" indent="-228600" algn="l" defTabSz="914400" rtl="0" eaLnBrk="1" latinLnBrk="0" hangingPunct="1">
+              <a:lnSpc>
+                <a:spcPct val="100000"/>
+              </a:lnSpc>
+              <a:spcBef>
+                <a:spcPts val="1000"/>
+              </a:spcBef>
+              <a:buClr>
+                <a:schemeClr val="accent2"/>
+              </a:buClr>
+              <a:buFont typeface="Arial" panose="020B0604020202020204" pitchFamily="34" charset="0"/>
+              <a:buChar char="•"/>
+              <a:defRPr sz="1600" kern="1200">
+                <a:solidFill>
+                  <a:schemeClr val="tx1">
+                    <a:lumMod val="85000"/>
+                    <a:lumOff val="15000"/>
+                  </a:schemeClr>
+                </a:solidFill>
+                <a:latin typeface="+mn-lt"/>
+                <a:ea typeface="+mn-ea"/>
+                <a:cs typeface="+mn-cs"/>
+              </a:defRPr>
+            </a:lvl3pPr>
+            <a:lvl4pPr marL="914400" indent="-228600" algn="l" defTabSz="914400" rtl="0" eaLnBrk="1" latinLnBrk="0" hangingPunct="1">
+              <a:lnSpc>
+                <a:spcPct val="100000"/>
+              </a:lnSpc>
+              <a:spcBef>
+                <a:spcPts val="1000"/>
+              </a:spcBef>
+              <a:buClr>
+                <a:schemeClr val="accent2"/>
+              </a:buClr>
+              <a:buFont typeface="Arial" panose="020B0604020202020204" pitchFamily="34" charset="0"/>
+              <a:buChar char="•"/>
+              <a:defRPr sz="1600" kern="1200">
+                <a:solidFill>
+                  <a:schemeClr val="tx1">
+                    <a:lumMod val="85000"/>
+                    <a:lumOff val="15000"/>
+                  </a:schemeClr>
+                </a:solidFill>
+                <a:latin typeface="+mn-lt"/>
+                <a:ea typeface="+mn-ea"/>
+                <a:cs typeface="+mn-cs"/>
+              </a:defRPr>
+            </a:lvl4pPr>
+            <a:lvl5pPr marL="1143000" indent="-228600" algn="l" defTabSz="914400" rtl="0" eaLnBrk="1" latinLnBrk="0" hangingPunct="1">
+              <a:lnSpc>
+                <a:spcPct val="100000"/>
+              </a:lnSpc>
+              <a:spcBef>
+                <a:spcPts val="1000"/>
+              </a:spcBef>
+              <a:buClr>
+                <a:schemeClr val="accent2"/>
+              </a:buClr>
+              <a:buFont typeface="Arial" panose="020B0604020202020204" pitchFamily="34" charset="0"/>
+              <a:buChar char="•"/>
+              <a:defRPr sz="1600" kern="1200">
+                <a:solidFill>
+                  <a:schemeClr val="tx1">
+                    <a:lumMod val="85000"/>
+                    <a:lumOff val="15000"/>
+                  </a:schemeClr>
+                </a:solidFill>
+                <a:latin typeface="+mn-lt"/>
+                <a:ea typeface="+mn-ea"/>
+                <a:cs typeface="+mn-cs"/>
+              </a:defRPr>
+            </a:lvl5pPr>
+            <a:lvl6pPr marL="1312863" indent="-228600" algn="l" defTabSz="914400" rtl="0" eaLnBrk="1" latinLnBrk="0" hangingPunct="1">
+              <a:lnSpc>
+                <a:spcPct val="100000"/>
+              </a:lnSpc>
+              <a:spcBef>
+                <a:spcPts val="1000"/>
+              </a:spcBef>
+              <a:buClr>
+                <a:schemeClr val="accent2"/>
+              </a:buClr>
+              <a:buFont typeface="Arial" panose="020B0604020202020204" pitchFamily="34" charset="0"/>
+              <a:buChar char="•"/>
+              <a:defRPr sz="1600" kern="1200">
+                <a:solidFill>
+                  <a:schemeClr val="tx1"/>
+                </a:solidFill>
+                <a:latin typeface="+mn-lt"/>
+                <a:ea typeface="+mn-ea"/>
+                <a:cs typeface="+mn-cs"/>
+              </a:defRPr>
+            </a:lvl6pPr>
+            <a:lvl7pPr marL="1484313" indent="-228600" algn="l" defTabSz="914400" rtl="0" eaLnBrk="1" latinLnBrk="0" hangingPunct="1">
+              <a:lnSpc>
+                <a:spcPct val="100000"/>
+              </a:lnSpc>
+              <a:spcBef>
+                <a:spcPts val="1000"/>
+              </a:spcBef>
+              <a:buClr>
+                <a:schemeClr val="accent2"/>
+              </a:buClr>
+              <a:buFont typeface="Arial" panose="020B0604020202020204" pitchFamily="34" charset="0"/>
+              <a:buChar char="•"/>
+              <a:defRPr sz="1600" kern="1200">
+                <a:solidFill>
+                  <a:schemeClr val="tx1"/>
+                </a:solidFill>
+                <a:latin typeface="+mn-lt"/>
+                <a:ea typeface="+mn-ea"/>
+                <a:cs typeface="+mn-cs"/>
+              </a:defRPr>
+            </a:lvl7pPr>
+            <a:lvl8pPr marL="1657350" indent="-228600" algn="l" defTabSz="914400" rtl="0" eaLnBrk="1" latinLnBrk="0" hangingPunct="1">
+              <a:lnSpc>
+                <a:spcPct val="100000"/>
+              </a:lnSpc>
+              <a:spcBef>
+                <a:spcPts val="1000"/>
+              </a:spcBef>
+              <a:buClr>
+                <a:schemeClr val="accent2"/>
+              </a:buClr>
+              <a:buFont typeface="Arial" panose="020B0604020202020204" pitchFamily="34" charset="0"/>
+              <a:buChar char="•"/>
+              <a:defRPr sz="1600" kern="1200" baseline="0">
+                <a:solidFill>
+                  <a:schemeClr val="tx1"/>
+                </a:solidFill>
+                <a:latin typeface="+mn-lt"/>
+                <a:ea typeface="+mn-ea"/>
+                <a:cs typeface="+mn-cs"/>
+              </a:defRPr>
+            </a:lvl8pPr>
+            <a:lvl9pPr marL="1882775" indent="-228600" algn="l" defTabSz="914400" rtl="0" eaLnBrk="1" latinLnBrk="0" hangingPunct="1">
+              <a:lnSpc>
+                <a:spcPct val="100000"/>
+              </a:lnSpc>
+              <a:spcBef>
+                <a:spcPts val="1000"/>
+              </a:spcBef>
+              <a:buClr>
+                <a:schemeClr val="accent2"/>
+              </a:buClr>
+              <a:buFont typeface="Arial" panose="020B0604020202020204" pitchFamily="34" charset="0"/>
+              <a:buChar char="•"/>
+              <a:defRPr sz="1600" kern="1200" baseline="0">
+                <a:solidFill>
+                  <a:schemeClr val="tx1"/>
+                </a:solidFill>
+                <a:latin typeface="+mn-lt"/>
+                <a:ea typeface="+mn-ea"/>
+                <a:cs typeface="+mn-cs"/>
+              </a:defRPr>
+            </a:lvl9pPr>
+          </a:lstStyle>
+          <a:p>
+            <a:r>
+              <a:rPr lang="en-US" b="1" dirty="0">
                 <a:sym typeface="Wingdings" pitchFamily="2" charset="2"/>
               </a:rPr>
               <a:t>Handling of Categorical Features Represented Numerically</a:t>
@@ -6149,7 +7997,7 @@
           <a:p>
             <a:pPr lvl="1"/>
             <a:r>
-              <a:rPr lang="en-US" sz="4800" dirty="0">
+              <a:rPr lang="en-US" dirty="0">
                 <a:sym typeface="Wingdings" pitchFamily="2" charset="2"/>
               </a:rPr>
               <a:t>Cast int as string</a:t>
@@ -6158,64 +8006,32 @@
           <a:p>
             <a:pPr lvl="1"/>
             <a:r>
-              <a:rPr lang="en-US" sz="4800" dirty="0">
+              <a:rPr lang="en-US" dirty="0">
                 <a:sym typeface="Wingdings" pitchFamily="2" charset="2"/>
               </a:rPr>
               <a:t>Features: </a:t>
             </a:r>
             <a:r>
-              <a:rPr lang="en-US" sz="4800" i="1" dirty="0" err="1">
+              <a:rPr lang="en-US" i="1" dirty="0" err="1">
                 <a:sym typeface="Wingdings" pitchFamily="2" charset="2"/>
               </a:rPr>
               <a:t>address_zip</a:t>
             </a:r>
             <a:r>
-              <a:rPr lang="en-US" sz="4800" dirty="0">
+              <a:rPr lang="en-US" dirty="0">
                 <a:sym typeface="Wingdings" pitchFamily="2" charset="2"/>
               </a:rPr>
               <a:t>, </a:t>
             </a:r>
             <a:r>
-              <a:rPr lang="en-US" sz="4800" i="1" dirty="0" err="1">
+              <a:rPr lang="en-US" i="1" dirty="0" err="1">
                 <a:sym typeface="Wingdings" pitchFamily="2" charset="2"/>
               </a:rPr>
               <a:t>bank_routing_number</a:t>
             </a:r>
-            <a:endParaRPr lang="en-US" sz="4800" i="1" dirty="0">
+            <a:endParaRPr lang="en-US" i="1" dirty="0">
               <a:sym typeface="Wingdings" pitchFamily="2" charset="2"/>
             </a:endParaRPr>
-          </a:p>
-          <a:p>
-            <a:pPr lvl="1"/>
-            <a:endParaRPr lang="en-US" sz="4800" dirty="0">
-              <a:sym typeface="Wingdings" pitchFamily="2" charset="2"/>
-            </a:endParaRPr>
-          </a:p>
-          <a:p>
-            <a:r>
-              <a:rPr lang="en-US" sz="5600" b="1" i="1" dirty="0">
-                <a:sym typeface="Wingdings" pitchFamily="2" charset="2"/>
-              </a:rPr>
-              <a:t>Credit Score Based Filtering</a:t>
-            </a:r>
-          </a:p>
-          <a:p>
-            <a:pPr lvl="1"/>
-            <a:r>
-              <a:rPr lang="en-US" sz="4800" dirty="0">
-                <a:sym typeface="Wingdings" pitchFamily="2" charset="2"/>
-              </a:rPr>
-              <a:t>L2C and FICO credit scores range from 300-850</a:t>
-            </a:r>
-          </a:p>
-          <a:p>
-            <a:pPr lvl="1"/>
-            <a:r>
-              <a:rPr lang="en-US" sz="4800" dirty="0">
-                <a:sym typeface="Wingdings" pitchFamily="2" charset="2"/>
-              </a:rPr>
-              <a:t>Remove anyone outside of predefined range – 30 samples</a:t>
-            </a:r>
           </a:p>
           <a:p>
             <a:pPr lvl="1"/>
@@ -6224,18 +8040,275 @@
             </a:endParaRPr>
           </a:p>
           <a:p>
-            <a:pPr marL="457200" lvl="1" indent="0">
-              <a:buNone/>
-            </a:pPr>
-            <a:endParaRPr lang="en-US" dirty="0">
-              <a:sym typeface="Wingdings" pitchFamily="2" charset="2"/>
-            </a:endParaRPr>
-          </a:p>
-          <a:p>
             <a:pPr lvl="1"/>
             <a:endParaRPr lang="en-US" dirty="0">
               <a:sym typeface="Wingdings" pitchFamily="2" charset="2"/>
             </a:endParaRPr>
+          </a:p>
+          <a:p>
+            <a:pPr lvl="1"/>
+            <a:endParaRPr lang="en-US" dirty="0"/>
+          </a:p>
+        </p:txBody>
+      </p:sp>
+      <p:sp>
+        <p:nvSpPr>
+          <p:cNvPr id="8" name="Content Placeholder 2">
+            <a:extLst>
+              <a:ext uri="{FF2B5EF4-FFF2-40B4-BE49-F238E27FC236}">
+                <a16:creationId xmlns:a16="http://schemas.microsoft.com/office/drawing/2014/main" id="{B4E951FA-C857-FAAA-C3BB-649E7C65F56D}"/>
+              </a:ext>
+            </a:extLst>
+          </p:cNvPr>
+          <p:cNvSpPr txBox="1">
+            <a:spLocks/>
+          </p:cNvSpPr>
+          <p:nvPr/>
+        </p:nvSpPr>
+        <p:spPr>
+          <a:xfrm>
+            <a:off x="6157519" y="4044949"/>
+            <a:ext cx="4569203" cy="1737551"/>
+          </a:xfrm>
+          <a:prstGeom prst="rect">
+            <a:avLst/>
+          </a:prstGeom>
+        </p:spPr>
+        <p:txBody>
+          <a:bodyPr vert="horz" lIns="91440" tIns="45720" rIns="91440" bIns="45720" rtlCol="0">
+            <a:normAutofit/>
+          </a:bodyPr>
+          <a:lstStyle>
+            <a:lvl1pPr marL="228600" indent="-228600" algn="l" defTabSz="914400" rtl="0" eaLnBrk="1" latinLnBrk="0" hangingPunct="1">
+              <a:lnSpc>
+                <a:spcPct val="100000"/>
+              </a:lnSpc>
+              <a:spcBef>
+                <a:spcPts val="1000"/>
+              </a:spcBef>
+              <a:buClr>
+                <a:schemeClr val="accent2"/>
+              </a:buClr>
+              <a:buFont typeface="Arial" panose="020B0604020202020204" pitchFamily="34" charset="0"/>
+              <a:buChar char="•"/>
+              <a:defRPr sz="1800" kern="1200">
+                <a:solidFill>
+                  <a:schemeClr val="tx1">
+                    <a:lumMod val="85000"/>
+                    <a:lumOff val="15000"/>
+                  </a:schemeClr>
+                </a:solidFill>
+                <a:latin typeface="+mn-lt"/>
+                <a:ea typeface="+mn-ea"/>
+                <a:cs typeface="+mn-cs"/>
+              </a:defRPr>
+            </a:lvl1pPr>
+            <a:lvl2pPr marL="457200" indent="-228600" algn="l" defTabSz="914400" rtl="0" eaLnBrk="1" latinLnBrk="0" hangingPunct="1">
+              <a:lnSpc>
+                <a:spcPct val="100000"/>
+              </a:lnSpc>
+              <a:spcBef>
+                <a:spcPts val="1000"/>
+              </a:spcBef>
+              <a:buClr>
+                <a:schemeClr val="accent2"/>
+              </a:buClr>
+              <a:buFont typeface="Arial" panose="020B0604020202020204" pitchFamily="34" charset="0"/>
+              <a:buChar char="•"/>
+              <a:defRPr sz="1600" kern="1200">
+                <a:solidFill>
+                  <a:schemeClr val="tx1">
+                    <a:lumMod val="85000"/>
+                    <a:lumOff val="15000"/>
+                  </a:schemeClr>
+                </a:solidFill>
+                <a:latin typeface="+mn-lt"/>
+                <a:ea typeface="+mn-ea"/>
+                <a:cs typeface="+mn-cs"/>
+              </a:defRPr>
+            </a:lvl2pPr>
+            <a:lvl3pPr marL="685800" indent="-228600" algn="l" defTabSz="914400" rtl="0" eaLnBrk="1" latinLnBrk="0" hangingPunct="1">
+              <a:lnSpc>
+                <a:spcPct val="100000"/>
+              </a:lnSpc>
+              <a:spcBef>
+                <a:spcPts val="1000"/>
+              </a:spcBef>
+              <a:buClr>
+                <a:schemeClr val="accent2"/>
+              </a:buClr>
+              <a:buFont typeface="Arial" panose="020B0604020202020204" pitchFamily="34" charset="0"/>
+              <a:buChar char="•"/>
+              <a:defRPr sz="1600" kern="1200">
+                <a:solidFill>
+                  <a:schemeClr val="tx1">
+                    <a:lumMod val="85000"/>
+                    <a:lumOff val="15000"/>
+                  </a:schemeClr>
+                </a:solidFill>
+                <a:latin typeface="+mn-lt"/>
+                <a:ea typeface="+mn-ea"/>
+                <a:cs typeface="+mn-cs"/>
+              </a:defRPr>
+            </a:lvl3pPr>
+            <a:lvl4pPr marL="914400" indent="-228600" algn="l" defTabSz="914400" rtl="0" eaLnBrk="1" latinLnBrk="0" hangingPunct="1">
+              <a:lnSpc>
+                <a:spcPct val="100000"/>
+              </a:lnSpc>
+              <a:spcBef>
+                <a:spcPts val="1000"/>
+              </a:spcBef>
+              <a:buClr>
+                <a:schemeClr val="accent2"/>
+              </a:buClr>
+              <a:buFont typeface="Arial" panose="020B0604020202020204" pitchFamily="34" charset="0"/>
+              <a:buChar char="•"/>
+              <a:defRPr sz="1600" kern="1200">
+                <a:solidFill>
+                  <a:schemeClr val="tx1">
+                    <a:lumMod val="85000"/>
+                    <a:lumOff val="15000"/>
+                  </a:schemeClr>
+                </a:solidFill>
+                <a:latin typeface="+mn-lt"/>
+                <a:ea typeface="+mn-ea"/>
+                <a:cs typeface="+mn-cs"/>
+              </a:defRPr>
+            </a:lvl4pPr>
+            <a:lvl5pPr marL="1143000" indent="-228600" algn="l" defTabSz="914400" rtl="0" eaLnBrk="1" latinLnBrk="0" hangingPunct="1">
+              <a:lnSpc>
+                <a:spcPct val="100000"/>
+              </a:lnSpc>
+              <a:spcBef>
+                <a:spcPts val="1000"/>
+              </a:spcBef>
+              <a:buClr>
+                <a:schemeClr val="accent2"/>
+              </a:buClr>
+              <a:buFont typeface="Arial" panose="020B0604020202020204" pitchFamily="34" charset="0"/>
+              <a:buChar char="•"/>
+              <a:defRPr sz="1600" kern="1200">
+                <a:solidFill>
+                  <a:schemeClr val="tx1">
+                    <a:lumMod val="85000"/>
+                    <a:lumOff val="15000"/>
+                  </a:schemeClr>
+                </a:solidFill>
+                <a:latin typeface="+mn-lt"/>
+                <a:ea typeface="+mn-ea"/>
+                <a:cs typeface="+mn-cs"/>
+              </a:defRPr>
+            </a:lvl5pPr>
+            <a:lvl6pPr marL="1312863" indent="-228600" algn="l" defTabSz="914400" rtl="0" eaLnBrk="1" latinLnBrk="0" hangingPunct="1">
+              <a:lnSpc>
+                <a:spcPct val="100000"/>
+              </a:lnSpc>
+              <a:spcBef>
+                <a:spcPts val="1000"/>
+              </a:spcBef>
+              <a:buClr>
+                <a:schemeClr val="accent2"/>
+              </a:buClr>
+              <a:buFont typeface="Arial" panose="020B0604020202020204" pitchFamily="34" charset="0"/>
+              <a:buChar char="•"/>
+              <a:defRPr sz="1600" kern="1200">
+                <a:solidFill>
+                  <a:schemeClr val="tx1"/>
+                </a:solidFill>
+                <a:latin typeface="+mn-lt"/>
+                <a:ea typeface="+mn-ea"/>
+                <a:cs typeface="+mn-cs"/>
+              </a:defRPr>
+            </a:lvl6pPr>
+            <a:lvl7pPr marL="1484313" indent="-228600" algn="l" defTabSz="914400" rtl="0" eaLnBrk="1" latinLnBrk="0" hangingPunct="1">
+              <a:lnSpc>
+                <a:spcPct val="100000"/>
+              </a:lnSpc>
+              <a:spcBef>
+                <a:spcPts val="1000"/>
+              </a:spcBef>
+              <a:buClr>
+                <a:schemeClr val="accent2"/>
+              </a:buClr>
+              <a:buFont typeface="Arial" panose="020B0604020202020204" pitchFamily="34" charset="0"/>
+              <a:buChar char="•"/>
+              <a:defRPr sz="1600" kern="1200">
+                <a:solidFill>
+                  <a:schemeClr val="tx1"/>
+                </a:solidFill>
+                <a:latin typeface="+mn-lt"/>
+                <a:ea typeface="+mn-ea"/>
+                <a:cs typeface="+mn-cs"/>
+              </a:defRPr>
+            </a:lvl7pPr>
+            <a:lvl8pPr marL="1657350" indent="-228600" algn="l" defTabSz="914400" rtl="0" eaLnBrk="1" latinLnBrk="0" hangingPunct="1">
+              <a:lnSpc>
+                <a:spcPct val="100000"/>
+              </a:lnSpc>
+              <a:spcBef>
+                <a:spcPts val="1000"/>
+              </a:spcBef>
+              <a:buClr>
+                <a:schemeClr val="accent2"/>
+              </a:buClr>
+              <a:buFont typeface="Arial" panose="020B0604020202020204" pitchFamily="34" charset="0"/>
+              <a:buChar char="•"/>
+              <a:defRPr sz="1600" kern="1200" baseline="0">
+                <a:solidFill>
+                  <a:schemeClr val="tx1"/>
+                </a:solidFill>
+                <a:latin typeface="+mn-lt"/>
+                <a:ea typeface="+mn-ea"/>
+                <a:cs typeface="+mn-cs"/>
+              </a:defRPr>
+            </a:lvl8pPr>
+            <a:lvl9pPr marL="1882775" indent="-228600" algn="l" defTabSz="914400" rtl="0" eaLnBrk="1" latinLnBrk="0" hangingPunct="1">
+              <a:lnSpc>
+                <a:spcPct val="100000"/>
+              </a:lnSpc>
+              <a:spcBef>
+                <a:spcPts val="1000"/>
+              </a:spcBef>
+              <a:buClr>
+                <a:schemeClr val="accent2"/>
+              </a:buClr>
+              <a:buFont typeface="Arial" panose="020B0604020202020204" pitchFamily="34" charset="0"/>
+              <a:buChar char="•"/>
+              <a:defRPr sz="1600" kern="1200" baseline="0">
+                <a:solidFill>
+                  <a:schemeClr val="tx1"/>
+                </a:solidFill>
+                <a:latin typeface="+mn-lt"/>
+                <a:ea typeface="+mn-ea"/>
+                <a:cs typeface="+mn-cs"/>
+              </a:defRPr>
+            </a:lvl9pPr>
+          </a:lstStyle>
+          <a:p>
+            <a:r>
+              <a:rPr lang="en-US" b="1" i="1" dirty="0">
+                <a:sym typeface="Wingdings" pitchFamily="2" charset="2"/>
+              </a:rPr>
+              <a:t>Credit Score Based Filtering</a:t>
+            </a:r>
+          </a:p>
+          <a:p>
+            <a:pPr lvl="1"/>
+            <a:r>
+              <a:rPr lang="en-US" dirty="0">
+                <a:sym typeface="Wingdings" pitchFamily="2" charset="2"/>
+              </a:rPr>
+              <a:t>L2C and FICO credit scores range from      300-850</a:t>
+            </a:r>
+          </a:p>
+          <a:p>
+            <a:pPr lvl="1"/>
+            <a:r>
+              <a:rPr lang="en-US" dirty="0">
+                <a:sym typeface="Wingdings" pitchFamily="2" charset="2"/>
+              </a:rPr>
+              <a:t>Remove anyone outside of predefined range -30 samples</a:t>
+            </a:r>
           </a:p>
           <a:p>
             <a:pPr lvl="1"/>
@@ -6296,12 +8369,14 @@
           </a:xfrm>
         </p:spPr>
         <p:txBody>
-          <a:bodyPr/>
+          <a:bodyPr>
+            <a:normAutofit/>
+          </a:bodyPr>
           <a:lstStyle/>
           <a:p>
             <a:pPr algn="ctr"/>
             <a:r>
-              <a:rPr lang="en-US" b="1" dirty="0">
+              <a:rPr lang="en-US" sz="3200" b="1" dirty="0">
                 <a:latin typeface="Calibri" panose="020F0502020204030204" pitchFamily="34" charset="0"/>
                 <a:cs typeface="Calibri" panose="020F0502020204030204" pitchFamily="34" charset="0"/>
               </a:rPr>
@@ -6329,7 +8404,7 @@
         <p:spPr>
           <a:xfrm>
             <a:off x="838200" y="1863301"/>
-            <a:ext cx="10515600" cy="4351338"/>
+            <a:ext cx="8441602" cy="4351338"/>
           </a:xfrm>
         </p:spPr>
         <p:txBody>
@@ -6338,75 +8413,108 @@
           </a:bodyPr>
           <a:lstStyle/>
           <a:p>
-            <a:r>
-              <a:rPr lang="en-US" sz="1800" dirty="0"/>
+            <a:pPr>
+              <a:spcBef>
+                <a:spcPts val="400"/>
+              </a:spcBef>
+            </a:pPr>
+            <a:r>
+              <a:rPr lang="en-US" sz="2000" dirty="0"/>
               <a:t>Categorical Features </a:t>
             </a:r>
             <a:r>
-              <a:rPr lang="en-US" sz="1800" dirty="0">
+              <a:rPr lang="en-US" sz="2000" dirty="0">
                 <a:sym typeface="Wingdings" pitchFamily="2" charset="2"/>
               </a:rPr>
               <a:t> Value Counts, Histograms</a:t>
             </a:r>
           </a:p>
           <a:p>
-            <a:r>
-              <a:rPr lang="en-US" sz="1800" dirty="0"/>
+            <a:pPr>
+              <a:spcBef>
+                <a:spcPts val="400"/>
+              </a:spcBef>
+            </a:pPr>
+            <a:r>
+              <a:rPr lang="en-US" sz="2000" dirty="0"/>
               <a:t>Numeric Features </a:t>
             </a:r>
             <a:r>
-              <a:rPr lang="en-US" sz="1800" dirty="0">
+              <a:rPr lang="en-US" sz="2000" dirty="0">
                 <a:sym typeface="Wingdings" pitchFamily="2" charset="2"/>
               </a:rPr>
               <a:t> Descriptive Statistics, Histograms</a:t>
             </a:r>
           </a:p>
           <a:p>
-            <a:r>
-              <a:rPr lang="en-US" sz="1800" b="1" i="1" dirty="0"/>
+            <a:pPr>
+              <a:spcBef>
+                <a:spcPts val="400"/>
+              </a:spcBef>
+            </a:pPr>
+            <a:r>
+              <a:rPr lang="en-US" sz="2000" b="1" i="1" dirty="0"/>
               <a:t>Purpose</a:t>
             </a:r>
             <a:r>
+              <a:rPr lang="en-US" sz="2000" dirty="0"/>
+              <a:t>: Get overall feel for features – possible values, variance,                 mean, mode</a:t>
+            </a:r>
+          </a:p>
+          <a:p>
+            <a:pPr lvl="1">
+              <a:spcBef>
+                <a:spcPts val="400"/>
+              </a:spcBef>
+            </a:pPr>
+            <a:r>
               <a:rPr lang="en-US" sz="1800" dirty="0"/>
-              <a:t>: Get overall feel for features – possible values, variance, mean, mode</a:t>
-            </a:r>
-          </a:p>
-          <a:p>
-            <a:pPr lvl="1"/>
-            <a:r>
-              <a:rPr lang="en-US" sz="1600" dirty="0"/>
               <a:t>Gives intuition into feature engineering and feature selection </a:t>
             </a:r>
           </a:p>
           <a:p>
-            <a:r>
-              <a:rPr lang="en-US" sz="1800" b="1" i="1" dirty="0"/>
+            <a:pPr>
+              <a:spcBef>
+                <a:spcPts val="400"/>
+              </a:spcBef>
+            </a:pPr>
+            <a:r>
+              <a:rPr lang="en-US" sz="2000" b="1" i="1" dirty="0"/>
               <a:t>Target Feature Distribution</a:t>
             </a:r>
-            <a:endParaRPr lang="en-US" sz="1800" dirty="0"/>
-          </a:p>
-          <a:p>
-            <a:pPr lvl="1"/>
-            <a:r>
-              <a:rPr lang="en-US" sz="1400" dirty="0"/>
+            <a:endParaRPr lang="en-US" sz="2000" dirty="0"/>
+          </a:p>
+          <a:p>
+            <a:pPr lvl="1">
+              <a:spcBef>
+                <a:spcPts val="400"/>
+              </a:spcBef>
+            </a:pPr>
+            <a:r>
+              <a:rPr lang="en-US" dirty="0"/>
               <a:t>55.3% Bad</a:t>
             </a:r>
           </a:p>
           <a:p>
-            <a:pPr lvl="1"/>
-            <a:r>
-              <a:rPr lang="en-US" sz="1400" dirty="0"/>
+            <a:pPr lvl="1">
+              <a:spcBef>
+                <a:spcPts val="400"/>
+              </a:spcBef>
+            </a:pPr>
+            <a:r>
+              <a:rPr lang="en-US" dirty="0"/>
               <a:t>44.7% Good</a:t>
             </a:r>
+            <a:endParaRPr lang="en-US" sz="1400" dirty="0"/>
           </a:p>
         </p:txBody>
       </p:sp>
       <p:pic>
         <p:nvPicPr>
-          <p:cNvPr id="9" name="Picture 8" descr="Chart, bar chart&#10;&#10;Description automatically generated">
+          <p:cNvPr id="11" name="Picture 10" descr="Chart&#10;&#10;Description automatically generated with low confidence">
             <a:extLst>
               <a:ext uri="{FF2B5EF4-FFF2-40B4-BE49-F238E27FC236}">
-                <a16:creationId xmlns:a16="http://schemas.microsoft.com/office/drawing/2014/main" id="{5CB9F5FC-01FF-D68F-629E-30BEC14C0A01}"/>
+                <a16:creationId xmlns:a16="http://schemas.microsoft.com/office/drawing/2014/main" id="{8E7FF2A6-A3C1-122D-C5A7-26092151AAFF}"/>
               </a:ext>
             </a:extLst>
           </p:cNvPr>
@@ -6423,46 +8531,8 @@
         </p:blipFill>
         <p:spPr>
           <a:xfrm>
-            <a:off x="493412" y="4710553"/>
-            <a:ext cx="3017520" cy="2011680"/>
-          </a:xfrm>
-          <a:prstGeom prst="rect">
-            <a:avLst/>
-          </a:prstGeom>
-          <a:solidFill>
-            <a:schemeClr val="bg1"/>
-          </a:solidFill>
-          <a:ln>
-            <a:solidFill>
-              <a:schemeClr val="tx1"/>
-            </a:solidFill>
-          </a:ln>
-        </p:spPr>
-      </p:pic>
-      <p:pic>
-        <p:nvPicPr>
-          <p:cNvPr id="11" name="Picture 10" descr="Chart&#10;&#10;Description automatically generated with low confidence">
-            <a:extLst>
-              <a:ext uri="{FF2B5EF4-FFF2-40B4-BE49-F238E27FC236}">
-                <a16:creationId xmlns:a16="http://schemas.microsoft.com/office/drawing/2014/main" id="{8E7FF2A6-A3C1-122D-C5A7-26092151AAFF}"/>
-              </a:ext>
-            </a:extLst>
-          </p:cNvPr>
-          <p:cNvPicPr>
-            <a:picLocks noChangeAspect="1"/>
-          </p:cNvPicPr>
-          <p:nvPr/>
-        </p:nvPicPr>
-        <p:blipFill>
-          <a:blip r:embed="rId3"/>
-          <a:stretch>
-            <a:fillRect/>
-          </a:stretch>
-        </p:blipFill>
-        <p:spPr>
-          <a:xfrm>
-            <a:off x="3780219" y="4710553"/>
-            <a:ext cx="3017520" cy="2011680"/>
+            <a:off x="3098226" y="4038970"/>
+            <a:ext cx="3703320" cy="2468880"/>
           </a:xfrm>
           <a:prstGeom prst="rect">
             <a:avLst/>
@@ -6492,53 +8562,15 @@
           <p:nvPr/>
         </p:nvPicPr>
         <p:blipFill>
-          <a:blip r:embed="rId4"/>
+          <a:blip r:embed="rId3"/>
           <a:stretch>
             <a:fillRect/>
           </a:stretch>
         </p:blipFill>
         <p:spPr>
           <a:xfrm>
-            <a:off x="7142527" y="4710553"/>
-            <a:ext cx="3017520" cy="2011680"/>
-          </a:xfrm>
-          <a:prstGeom prst="rect">
-            <a:avLst/>
-          </a:prstGeom>
-          <a:solidFill>
-            <a:schemeClr val="bg1"/>
-          </a:solidFill>
-          <a:ln>
-            <a:solidFill>
-              <a:schemeClr val="tx1"/>
-            </a:solidFill>
-          </a:ln>
-        </p:spPr>
-      </p:pic>
-      <p:pic>
-        <p:nvPicPr>
-          <p:cNvPr id="15" name="Picture 14" descr="Chart, histogram&#10;&#10;Description automatically generated">
-            <a:extLst>
-              <a:ext uri="{FF2B5EF4-FFF2-40B4-BE49-F238E27FC236}">
-                <a16:creationId xmlns:a16="http://schemas.microsoft.com/office/drawing/2014/main" id="{9418F4AB-7772-6315-C9AE-B7748CDFBA36}"/>
-              </a:ext>
-            </a:extLst>
-          </p:cNvPr>
-          <p:cNvPicPr>
-            <a:picLocks noChangeAspect="1"/>
-          </p:cNvPicPr>
-          <p:nvPr/>
-        </p:nvPicPr>
-        <p:blipFill>
-          <a:blip r:embed="rId5"/>
-          <a:stretch>
-            <a:fillRect/>
-          </a:stretch>
-        </p:blipFill>
-        <p:spPr>
-          <a:xfrm>
-            <a:off x="8531265" y="2423160"/>
-            <a:ext cx="3017520" cy="2011680"/>
+            <a:off x="7428142" y="4038970"/>
+            <a:ext cx="3703320" cy="2468880"/>
           </a:xfrm>
           <a:prstGeom prst="rect">
             <a:avLst/>
@@ -6606,12 +8638,14 @@
           </a:xfrm>
         </p:spPr>
         <p:txBody>
-          <a:bodyPr/>
+          <a:bodyPr>
+            <a:normAutofit/>
+          </a:bodyPr>
           <a:lstStyle/>
           <a:p>
             <a:pPr algn="ctr"/>
             <a:r>
-              <a:rPr lang="en-US" b="1" dirty="0">
+              <a:rPr lang="en-US" sz="3200" b="1" dirty="0">
                 <a:latin typeface="Calibri" panose="020F0502020204030204" pitchFamily="34" charset="0"/>
                 <a:cs typeface="Calibri" panose="020F0502020204030204" pitchFamily="34" charset="0"/>
               </a:rPr>
@@ -6654,8 +8688,17 @@
               <a:rPr lang="en-US" sz="2400" dirty="0">
                 <a:sym typeface="Wingdings" pitchFamily="2" charset="2"/>
               </a:rPr>
-              <a:t> Conditioned Value Counts, Conditioned VC Tables</a:t>
-            </a:r>
+              <a:t> Conditioned Value Counts, </a:t>
+            </a:r>
+            <a:r>
+              <a:rPr lang="en-US" sz="2400" dirty="0" err="1">
+                <a:sym typeface="Wingdings" pitchFamily="2" charset="2"/>
+              </a:rPr>
+              <a:t>Barplots</a:t>
+            </a:r>
+            <a:endParaRPr lang="en-US" sz="2400" dirty="0">
+              <a:sym typeface="Wingdings" pitchFamily="2" charset="2"/>
+            </a:endParaRPr>
           </a:p>
           <a:p>
             <a:r>
@@ -6666,7 +8709,7 @@
               <a:rPr lang="en-US" sz="2400" dirty="0">
                 <a:sym typeface="Wingdings" pitchFamily="2" charset="2"/>
               </a:rPr>
-              <a:t> Conditioned Descriptive Statistics, Scatter plots</a:t>
+              <a:t> Scatter plots</a:t>
             </a:r>
           </a:p>
           <a:p>
@@ -6689,10 +8732,10 @@
       </p:sp>
       <p:pic>
         <p:nvPicPr>
-          <p:cNvPr id="9" name="Picture 8" descr="Table&#10;&#10;Description automatically generated">
+          <p:cNvPr id="15" name="Picture 14" descr="Graphical user interface, text&#10;&#10;Description automatically generated">
             <a:extLst>
               <a:ext uri="{FF2B5EF4-FFF2-40B4-BE49-F238E27FC236}">
-                <a16:creationId xmlns:a16="http://schemas.microsoft.com/office/drawing/2014/main" id="{E28E3A58-0BE8-7BCC-DE04-68A6844D457E}"/>
+                <a16:creationId xmlns:a16="http://schemas.microsoft.com/office/drawing/2014/main" id="{5B86C25C-B516-F9D2-6653-76E4BF13D0E9}"/>
               </a:ext>
             </a:extLst>
           </p:cNvPr>
@@ -6709,8 +8752,46 @@
         </p:blipFill>
         <p:spPr>
           <a:xfrm>
-            <a:off x="242364" y="4782268"/>
-            <a:ext cx="3156857" cy="1828800"/>
+            <a:off x="8341238" y="4261301"/>
+            <a:ext cx="3566160" cy="2377440"/>
+          </a:xfrm>
+          <a:prstGeom prst="rect">
+            <a:avLst/>
+          </a:prstGeom>
+          <a:solidFill>
+            <a:schemeClr val="bg1"/>
+          </a:solidFill>
+          <a:ln>
+            <a:solidFill>
+              <a:schemeClr val="tx1"/>
+            </a:solidFill>
+          </a:ln>
+        </p:spPr>
+      </p:pic>
+      <p:pic>
+        <p:nvPicPr>
+          <p:cNvPr id="12" name="Picture 11" descr="A screenshot of a number&#10;&#10;Description automatically generated with low confidence">
+            <a:extLst>
+              <a:ext uri="{FF2B5EF4-FFF2-40B4-BE49-F238E27FC236}">
+                <a16:creationId xmlns:a16="http://schemas.microsoft.com/office/drawing/2014/main" id="{4CB12929-C832-8FAB-3819-EE7B126410B2}"/>
+              </a:ext>
+            </a:extLst>
+          </p:cNvPr>
+          <p:cNvPicPr>
+            <a:picLocks noChangeAspect="1"/>
+          </p:cNvPicPr>
+          <p:nvPr/>
+        </p:nvPicPr>
+        <p:blipFill>
+          <a:blip r:embed="rId3"/>
+          <a:stretch>
+            <a:fillRect/>
+          </a:stretch>
+        </p:blipFill>
+        <p:spPr>
+          <a:xfrm>
+            <a:off x="284602" y="4247577"/>
+            <a:ext cx="4355433" cy="2377440"/>
           </a:xfrm>
           <a:prstGeom prst="rect">
             <a:avLst/>
@@ -6724,45 +8805,10 @@
       </p:pic>
       <p:pic>
         <p:nvPicPr>
-          <p:cNvPr id="11" name="Picture 10" descr="Table&#10;&#10;Description automatically generated">
+          <p:cNvPr id="16" name="Picture 15" descr="A picture containing text, screenshot, diagram, rectangle&#10;&#10;Description automatically generated">
             <a:extLst>
               <a:ext uri="{FF2B5EF4-FFF2-40B4-BE49-F238E27FC236}">
-                <a16:creationId xmlns:a16="http://schemas.microsoft.com/office/drawing/2014/main" id="{BF0C41A5-6578-03CA-D7C9-EA2A3E057E36}"/>
-              </a:ext>
-            </a:extLst>
-          </p:cNvPr>
-          <p:cNvPicPr>
-            <a:picLocks/>
-          </p:cNvPicPr>
-          <p:nvPr/>
-        </p:nvPicPr>
-        <p:blipFill>
-          <a:blip r:embed="rId3"/>
-          <a:stretch>
-            <a:fillRect/>
-          </a:stretch>
-        </p:blipFill>
-        <p:spPr>
-          <a:xfrm>
-            <a:off x="3625541" y="4783426"/>
-            <a:ext cx="3154680" cy="1828800"/>
-          </a:xfrm>
-          <a:prstGeom prst="rect">
-            <a:avLst/>
-          </a:prstGeom>
-          <a:ln>
-            <a:solidFill>
-              <a:schemeClr val="tx1"/>
-            </a:solidFill>
-          </a:ln>
-        </p:spPr>
-      </p:pic>
-      <p:pic>
-        <p:nvPicPr>
-          <p:cNvPr id="13" name="Picture 12" descr="Text&#10;&#10;Description automatically generated">
-            <a:extLst>
-              <a:ext uri="{FF2B5EF4-FFF2-40B4-BE49-F238E27FC236}">
-                <a16:creationId xmlns:a16="http://schemas.microsoft.com/office/drawing/2014/main" id="{34043953-4D1F-7AAA-1E0C-3615C3C7FA11}"/>
+                <a16:creationId xmlns:a16="http://schemas.microsoft.com/office/drawing/2014/main" id="{24C45F22-E166-CF75-9E42-D649AF422DD7}"/>
               </a:ext>
             </a:extLst>
           </p:cNvPr>
@@ -6779,53 +8825,12 @@
         </p:blipFill>
         <p:spPr>
           <a:xfrm>
-            <a:off x="9206436" y="2867940"/>
-            <a:ext cx="2743200" cy="1828800"/>
+            <a:off x="4905676" y="4261301"/>
+            <a:ext cx="3169920" cy="2377440"/>
           </a:xfrm>
           <a:prstGeom prst="rect">
             <a:avLst/>
           </a:prstGeom>
-          <a:solidFill>
-            <a:schemeClr val="bg1"/>
-          </a:solidFill>
-          <a:ln>
-            <a:solidFill>
-              <a:schemeClr val="tx1"/>
-            </a:solidFill>
-          </a:ln>
-        </p:spPr>
-      </p:pic>
-      <p:pic>
-        <p:nvPicPr>
-          <p:cNvPr id="15" name="Picture 14" descr="Graphical user interface, text&#10;&#10;Description automatically generated">
-            <a:extLst>
-              <a:ext uri="{FF2B5EF4-FFF2-40B4-BE49-F238E27FC236}">
-                <a16:creationId xmlns:a16="http://schemas.microsoft.com/office/drawing/2014/main" id="{5B86C25C-B516-F9D2-6653-76E4BF13D0E9}"/>
-              </a:ext>
-            </a:extLst>
-          </p:cNvPr>
-          <p:cNvPicPr>
-            <a:picLocks noChangeAspect="1"/>
-          </p:cNvPicPr>
-          <p:nvPr/>
-        </p:nvPicPr>
-        <p:blipFill>
-          <a:blip r:embed="rId5"/>
-          <a:stretch>
-            <a:fillRect/>
-          </a:stretch>
-        </p:blipFill>
-        <p:spPr>
-          <a:xfrm>
-            <a:off x="7006541" y="4782268"/>
-            <a:ext cx="2743200" cy="1828800"/>
-          </a:xfrm>
-          <a:prstGeom prst="rect">
-            <a:avLst/>
-          </a:prstGeom>
-          <a:solidFill>
-            <a:schemeClr val="bg1"/>
-          </a:solidFill>
           <a:ln>
             <a:solidFill>
               <a:schemeClr val="tx1"/>
@@ -6886,11 +8891,13 @@
           </a:xfrm>
         </p:spPr>
         <p:txBody>
-          <a:bodyPr/>
+          <a:bodyPr>
+            <a:normAutofit fontScale="90000"/>
+          </a:bodyPr>
           <a:lstStyle/>
           <a:p>
             <a:r>
-              <a:rPr lang="en-US" b="1" dirty="0">
+              <a:rPr lang="en-US" sz="3200" b="1" dirty="0">
                 <a:latin typeface="Calibri" panose="020F0502020204030204" pitchFamily="34" charset="0"/>
                 <a:cs typeface="Calibri" panose="020F0502020204030204" pitchFamily="34" charset="0"/>
               </a:rPr>
@@ -6923,66 +8930,89 @@
         </p:spPr>
         <p:txBody>
           <a:bodyPr>
-            <a:normAutofit/>
+            <a:normAutofit lnSpcReduction="10000"/>
           </a:bodyPr>
           <a:lstStyle/>
           <a:p>
             <a:r>
+              <a:rPr lang="en-US" sz="2400" dirty="0"/>
+              <a:t>Initial round of feature selection based on univariate/multivariate analysis</a:t>
+            </a:r>
+          </a:p>
+          <a:p>
+            <a:r>
+              <a:rPr lang="en-US" sz="2400" dirty="0"/>
+              <a:t>Remove features with that have zero/little predictive power</a:t>
+            </a:r>
+          </a:p>
+          <a:p>
+            <a:r>
+              <a:rPr lang="en-US" sz="2400" b="1" i="1" dirty="0"/>
+              <a:t>Removed Features</a:t>
+            </a:r>
+          </a:p>
+          <a:p>
+            <a:pPr lvl="1"/>
+            <a:r>
+              <a:rPr lang="en-US" sz="2000" i="1" dirty="0" err="1"/>
+              <a:t>customer_id</a:t>
+            </a:r>
+            <a:r>
+              <a:rPr lang="en-US" sz="2000" i="1" dirty="0"/>
+              <a:t>, status, email, </a:t>
+            </a:r>
+            <a:r>
+              <a:rPr lang="en-US" sz="2000" i="1" dirty="0" err="1"/>
+              <a:t>home_phone_type</a:t>
+            </a:r>
+            <a:r>
+              <a:rPr lang="en-US" sz="2000" i="1" dirty="0"/>
+              <a:t>, </a:t>
+            </a:r>
+            <a:r>
+              <a:rPr lang="en-US" sz="2000" i="1" dirty="0" err="1"/>
+              <a:t>how_use_money</a:t>
+            </a:r>
+            <a:r>
+              <a:rPr lang="en-US" sz="2000" i="1" dirty="0"/>
+              <a:t>, </a:t>
+            </a:r>
+            <a:r>
+              <a:rPr lang="en-US" sz="2000" i="1" dirty="0" err="1"/>
+              <a:t>idLoan</a:t>
+            </a:r>
+            <a:r>
+              <a:rPr lang="en-US" sz="2000" i="1" dirty="0"/>
+              <a:t>, </a:t>
+            </a:r>
+            <a:r>
+              <a:rPr lang="en-US" sz="2000" i="1" dirty="0" err="1"/>
+              <a:t>payment_ach</a:t>
+            </a:r>
+            <a:r>
+              <a:rPr lang="en-US" sz="2000" i="1" dirty="0"/>
+              <a:t>, </a:t>
+            </a:r>
+            <a:r>
+              <a:rPr lang="en-US" sz="2000" i="1" dirty="0" err="1"/>
+              <a:t>birth_date</a:t>
+            </a:r>
+            <a:endParaRPr lang="en-US" sz="2000" i="1" dirty="0"/>
+          </a:p>
+          <a:p>
+            <a:pPr lvl="2"/>
+            <a:r>
+              <a:rPr lang="en-US" sz="2000" i="1" dirty="0" err="1"/>
+              <a:t>birth_date</a:t>
+            </a:r>
+            <a:r>
+              <a:rPr lang="en-US" sz="2000" i="1" dirty="0"/>
+              <a:t>: </a:t>
+            </a:r>
+            <a:r>
               <a:rPr lang="en-US" sz="2000" dirty="0"/>
-              <a:t>Initial round of feature selection based on univariate/multivariate analysis</a:t>
-            </a:r>
-          </a:p>
-          <a:p>
-            <a:r>
-              <a:rPr lang="en-US" sz="2000" dirty="0"/>
-              <a:t>Remove features with zero/low variance of samples whose target feature has a large variance or that logically have zero predictive power</a:t>
-            </a:r>
-          </a:p>
-          <a:p>
-            <a:r>
-              <a:rPr lang="en-US" sz="2000" b="1" i="1" dirty="0"/>
-              <a:t>Removed Features</a:t>
-            </a:r>
-          </a:p>
-          <a:p>
-            <a:pPr lvl="1"/>
-            <a:r>
-              <a:rPr lang="en-US" sz="1800" i="1" dirty="0" err="1"/>
-              <a:t>customer_id</a:t>
-            </a:r>
-            <a:r>
-              <a:rPr lang="en-US" sz="1800" i="1" dirty="0"/>
-              <a:t>, status, email, </a:t>
-            </a:r>
-            <a:r>
-              <a:rPr lang="en-US" sz="1800" i="1" dirty="0" err="1"/>
-              <a:t>home_phone_type</a:t>
-            </a:r>
-            <a:r>
-              <a:rPr lang="en-US" sz="1800" i="1" dirty="0"/>
-              <a:t>, </a:t>
-            </a:r>
-            <a:r>
-              <a:rPr lang="en-US" sz="1800" i="1" dirty="0" err="1"/>
-              <a:t>how_use_money</a:t>
-            </a:r>
-            <a:r>
-              <a:rPr lang="en-US" sz="1800" i="1" dirty="0"/>
-              <a:t>, </a:t>
-            </a:r>
-            <a:r>
-              <a:rPr lang="en-US" sz="1800" i="1" dirty="0" err="1"/>
-              <a:t>idLoan</a:t>
-            </a:r>
-            <a:r>
-              <a:rPr lang="en-US" sz="1800" i="1" dirty="0"/>
-              <a:t>, </a:t>
-            </a:r>
-            <a:r>
-              <a:rPr lang="en-US" sz="1800" i="1" dirty="0" err="1"/>
-              <a:t>payment_ach</a:t>
-            </a:r>
-            <a:endParaRPr lang="en-US" sz="1800" i="1" dirty="0"/>
+              <a:t>Equal Credit Opportunity Act</a:t>
+            </a:r>
           </a:p>
         </p:txBody>
       </p:sp>
@@ -7039,12 +9069,14 @@
           </a:xfrm>
         </p:spPr>
         <p:txBody>
-          <a:bodyPr/>
+          <a:bodyPr>
+            <a:normAutofit/>
+          </a:bodyPr>
           <a:lstStyle/>
           <a:p>
             <a:pPr algn="ctr"/>
             <a:r>
-              <a:rPr lang="en-US" b="1" dirty="0">
+              <a:rPr lang="en-US" sz="3200" b="1" dirty="0">
                 <a:latin typeface="Calibri" panose="020F0502020204030204" pitchFamily="34" charset="0"/>
                 <a:cs typeface="Calibri" panose="020F0502020204030204" pitchFamily="34" charset="0"/>
               </a:rPr>
@@ -7071,37 +9103,54 @@
         </p:nvSpPr>
         <p:spPr>
           <a:xfrm>
-            <a:off x="2231136" y="1895912"/>
+            <a:off x="2231136" y="1778217"/>
             <a:ext cx="7729728" cy="4534291"/>
           </a:xfrm>
         </p:spPr>
         <p:txBody>
           <a:bodyPr>
-            <a:normAutofit fontScale="92500" lnSpcReduction="20000"/>
+            <a:noAutofit/>
           </a:bodyPr>
           <a:lstStyle/>
           <a:p>
+            <a:pPr>
+              <a:spcBef>
+                <a:spcPts val="400"/>
+              </a:spcBef>
+            </a:pPr>
             <a:r>
               <a:rPr lang="en-US" sz="1600" b="1" i="1" dirty="0"/>
               <a:t>Bin categorical features </a:t>
             </a:r>
           </a:p>
           <a:p>
-            <a:pPr lvl="1"/>
+            <a:pPr lvl="1">
+              <a:spcBef>
+                <a:spcPts val="400"/>
+              </a:spcBef>
+            </a:pPr>
             <a:r>
               <a:rPr lang="en-US" sz="1400" dirty="0"/>
-              <a:t>Serves to reduce the dimensionality of one-hot encoded outputs and to remove low frequency values</a:t>
-            </a:r>
-          </a:p>
-          <a:p>
-            <a:pPr lvl="1"/>
+              <a:t>Serves to reduce the dimensionality of one-hot encoded outputs by removing low frequency values</a:t>
+            </a:r>
+          </a:p>
+          <a:p>
+            <a:pPr lvl="1">
+              <a:spcBef>
+                <a:spcPts val="400"/>
+              </a:spcBef>
+            </a:pPr>
             <a:r>
               <a:rPr lang="en-US" sz="1400" dirty="0"/>
               <a:t>Features:</a:t>
             </a:r>
           </a:p>
           <a:p>
-            <a:pPr lvl="2"/>
+            <a:pPr lvl="2">
+              <a:spcBef>
+                <a:spcPts val="400"/>
+              </a:spcBef>
+            </a:pPr>
             <a:r>
               <a:rPr lang="en-US" sz="1400" i="1" dirty="0"/>
               <a:t>Address zip</a:t>
@@ -7130,7 +9179,11 @@
             </a:r>
           </a:p>
           <a:p>
-            <a:pPr lvl="2"/>
+            <a:pPr lvl="2">
+              <a:spcBef>
+                <a:spcPts val="400"/>
+              </a:spcBef>
+            </a:pPr>
             <a:r>
               <a:rPr lang="en-US" sz="1400" i="1" dirty="0"/>
               <a:t>Bank routing number</a:t>
@@ -7141,7 +9194,11 @@
             </a:r>
           </a:p>
           <a:p>
-            <a:pPr lvl="2"/>
+            <a:pPr lvl="2">
+              <a:spcBef>
+                <a:spcPts val="400"/>
+              </a:spcBef>
+            </a:pPr>
             <a:r>
               <a:rPr lang="en-US" sz="1400" i="1" dirty="0"/>
               <a:t>Duration features</a:t>
@@ -7152,24 +9209,22 @@
             </a:r>
           </a:p>
           <a:p>
+            <a:pPr>
+              <a:spcBef>
+                <a:spcPts val="400"/>
+              </a:spcBef>
+            </a:pPr>
             <a:r>
               <a:rPr lang="en-US" sz="1600" b="1" i="1" dirty="0"/>
               <a:t>Creation of new features</a:t>
             </a:r>
           </a:p>
           <a:p>
-            <a:pPr lvl="1"/>
-            <a:r>
-              <a:rPr lang="en-US" sz="1400" i="1" dirty="0" err="1"/>
-              <a:t>loanee_age</a:t>
-            </a:r>
-            <a:r>
-              <a:rPr lang="en-US" sz="1400" dirty="0"/>
-              <a:t>: feature encoding loanee age</a:t>
-            </a:r>
-          </a:p>
-          <a:p>
-            <a:pPr lvl="1"/>
+            <a:pPr lvl="1">
+              <a:spcBef>
+                <a:spcPts val="400"/>
+              </a:spcBef>
+            </a:pPr>
             <a:r>
               <a:rPr lang="en-US" sz="1400" i="1" dirty="0" err="1"/>
               <a:t>pays_rent</a:t>
@@ -7188,7 +9243,11 @@
             </a:r>
           </a:p>
           <a:p>
-            <a:pPr lvl="1"/>
+            <a:pPr lvl="1">
+              <a:spcBef>
+                <a:spcPts val="400"/>
+              </a:spcBef>
+            </a:pPr>
             <a:r>
               <a:rPr lang="en-US" sz="1400" i="1" dirty="0" err="1"/>
               <a:t>monthly_income_after_rent</a:t>
@@ -7199,13 +9258,22 @@
             </a:r>
           </a:p>
           <a:p>
+            <a:pPr>
+              <a:spcBef>
+                <a:spcPts val="400"/>
+              </a:spcBef>
+            </a:pPr>
             <a:r>
               <a:rPr lang="en-US" sz="1600" b="1" i="1" dirty="0"/>
               <a:t>Base Feature Set</a:t>
             </a:r>
           </a:p>
           <a:p>
-            <a:pPr lvl="1"/>
+            <a:pPr lvl="1">
+              <a:spcBef>
+                <a:spcPts val="400"/>
+              </a:spcBef>
+            </a:pPr>
             <a:r>
               <a:rPr lang="en-US" sz="1400" i="1" dirty="0" err="1"/>
               <a:t>amount_requested</a:t>
@@ -7353,14 +9421,6 @@
             <a:r>
               <a:rPr lang="en-US" sz="1400" i="1" dirty="0" err="1"/>
               <a:t>raw_FICO_money</a:t>
-            </a:r>
-            <a:r>
-              <a:rPr lang="en-US" sz="1400" i="1" dirty="0"/>
-              <a:t>, </a:t>
-            </a:r>
-            <a:r>
-              <a:rPr lang="en-US" sz="1400" i="1" dirty="0" err="1"/>
-              <a:t>loanee_age</a:t>
             </a:r>
             <a:r>
               <a:rPr lang="en-US" sz="1400" i="1" dirty="0"/>

</xml_diff>